<commit_message>
formatação apresentação módulo 2
</commit_message>
<xml_diff>
--- a/Módulo 2/Modulo 2.pptx
+++ b/Módulo 2/Modulo 2.pptx
@@ -20,15 +20,15 @@
     <p:sldId id="290" r:id="rId14"/>
     <p:sldId id="291" r:id="rId15"/>
     <p:sldId id="293" r:id="rId16"/>
-    <p:sldId id="294" r:id="rId17"/>
-    <p:sldId id="298" r:id="rId18"/>
-    <p:sldId id="295" r:id="rId19"/>
-    <p:sldId id="296" r:id="rId20"/>
-    <p:sldId id="299" r:id="rId21"/>
-    <p:sldId id="300" r:id="rId22"/>
-    <p:sldId id="301" r:id="rId23"/>
-    <p:sldId id="302" r:id="rId24"/>
-    <p:sldId id="303" r:id="rId25"/>
+    <p:sldId id="298" r:id="rId17"/>
+    <p:sldId id="295" r:id="rId18"/>
+    <p:sldId id="296" r:id="rId19"/>
+    <p:sldId id="299" r:id="rId20"/>
+    <p:sldId id="300" r:id="rId21"/>
+    <p:sldId id="301" r:id="rId22"/>
+    <p:sldId id="302" r:id="rId23"/>
+    <p:sldId id="303" r:id="rId24"/>
+    <p:sldId id="323" r:id="rId25"/>
     <p:sldId id="297" r:id="rId26"/>
     <p:sldId id="304" r:id="rId27"/>
     <p:sldId id="305" r:id="rId28"/>
@@ -342,7 +342,7 @@
           <a:p>
             <a:fld id="{05D07FE6-D4F0-43B8-8724-69D32D78BC5B}" type="datetimeFigureOut">
               <a:rPr lang="pt-BR" smtClean="0"/>
-              <a:t>15/04/2019</a:t>
+              <a:t>17/04/2019</a:t>
             </a:fld>
             <a:endParaRPr lang="pt-BR"/>
           </a:p>
@@ -607,7 +607,7 @@
           <a:p>
             <a:fld id="{05D07FE6-D4F0-43B8-8724-69D32D78BC5B}" type="datetimeFigureOut">
               <a:rPr lang="pt-BR" smtClean="0"/>
-              <a:t>15/04/2019</a:t>
+              <a:t>17/04/2019</a:t>
             </a:fld>
             <a:endParaRPr lang="pt-BR"/>
           </a:p>
@@ -782,7 +782,7 @@
           <a:p>
             <a:fld id="{05D07FE6-D4F0-43B8-8724-69D32D78BC5B}" type="datetimeFigureOut">
               <a:rPr lang="pt-BR" smtClean="0"/>
-              <a:t>15/04/2019</a:t>
+              <a:t>17/04/2019</a:t>
             </a:fld>
             <a:endParaRPr lang="pt-BR"/>
           </a:p>
@@ -947,7 +947,7 @@
           <a:p>
             <a:fld id="{05D07FE6-D4F0-43B8-8724-69D32D78BC5B}" type="datetimeFigureOut">
               <a:rPr lang="pt-BR" smtClean="0"/>
-              <a:t>15/04/2019</a:t>
+              <a:t>17/04/2019</a:t>
             </a:fld>
             <a:endParaRPr lang="pt-BR"/>
           </a:p>
@@ -1196,7 +1196,7 @@
           <a:p>
             <a:fld id="{05D07FE6-D4F0-43B8-8724-69D32D78BC5B}" type="datetimeFigureOut">
               <a:rPr lang="pt-BR" smtClean="0"/>
-              <a:t>15/04/2019</a:t>
+              <a:t>17/04/2019</a:t>
             </a:fld>
             <a:endParaRPr lang="pt-BR"/>
           </a:p>
@@ -1479,7 +1479,7 @@
           <a:p>
             <a:fld id="{05D07FE6-D4F0-43B8-8724-69D32D78BC5B}" type="datetimeFigureOut">
               <a:rPr lang="pt-BR" smtClean="0"/>
-              <a:t>15/04/2019</a:t>
+              <a:t>17/04/2019</a:t>
             </a:fld>
             <a:endParaRPr lang="pt-BR"/>
           </a:p>
@@ -1918,7 +1918,7 @@
           <a:p>
             <a:fld id="{05D07FE6-D4F0-43B8-8724-69D32D78BC5B}" type="datetimeFigureOut">
               <a:rPr lang="pt-BR" smtClean="0"/>
-              <a:t>15/04/2019</a:t>
+              <a:t>17/04/2019</a:t>
             </a:fld>
             <a:endParaRPr lang="pt-BR"/>
           </a:p>
@@ -2031,7 +2031,7 @@
           <a:p>
             <a:fld id="{05D07FE6-D4F0-43B8-8724-69D32D78BC5B}" type="datetimeFigureOut">
               <a:rPr lang="pt-BR" smtClean="0"/>
-              <a:t>15/04/2019</a:t>
+              <a:t>17/04/2019</a:t>
             </a:fld>
             <a:endParaRPr lang="pt-BR"/>
           </a:p>
@@ -2121,7 +2121,7 @@
           <a:p>
             <a:fld id="{05D07FE6-D4F0-43B8-8724-69D32D78BC5B}" type="datetimeFigureOut">
               <a:rPr lang="pt-BR" smtClean="0"/>
-              <a:t>15/04/2019</a:t>
+              <a:t>17/04/2019</a:t>
             </a:fld>
             <a:endParaRPr lang="pt-BR"/>
           </a:p>
@@ -2363,7 +2363,7 @@
           <a:p>
             <a:fld id="{05D07FE6-D4F0-43B8-8724-69D32D78BC5B}" type="datetimeFigureOut">
               <a:rPr lang="pt-BR" smtClean="0"/>
-              <a:t>15/04/2019</a:t>
+              <a:t>17/04/2019</a:t>
             </a:fld>
             <a:endParaRPr lang="pt-BR"/>
           </a:p>
@@ -2657,7 +2657,7 @@
           <a:p>
             <a:fld id="{05D07FE6-D4F0-43B8-8724-69D32D78BC5B}" type="datetimeFigureOut">
               <a:rPr lang="pt-BR" smtClean="0"/>
-              <a:t>15/04/2019</a:t>
+              <a:t>17/04/2019</a:t>
             </a:fld>
             <a:endParaRPr lang="pt-BR"/>
           </a:p>
@@ -2951,7 +2951,7 @@
           <a:p>
             <a:fld id="{05D07FE6-D4F0-43B8-8724-69D32D78BC5B}" type="datetimeFigureOut">
               <a:rPr lang="pt-BR" smtClean="0"/>
-              <a:t>15/04/2019</a:t>
+              <a:t>17/04/2019</a:t>
             </a:fld>
             <a:endParaRPr lang="pt-BR"/>
           </a:p>
@@ -3808,18 +3808,11 @@
               <a:t>, podemos utilizar os </a:t>
             </a:r>
             <a:r>
-              <a:rPr lang="pt-BR" sz="2600" b="0" dirty="0" err="1">
-                <a:latin typeface="Times New Roman" pitchFamily="18" charset="0"/>
-                <a:cs typeface="Times New Roman" pitchFamily="18" charset="0"/>
-              </a:rPr>
-              <a:t>acessores</a:t>
-            </a:r>
-            <a:r>
-              <a:rPr lang="pt-BR" sz="2600" b="0" dirty="0">
-                <a:latin typeface="Times New Roman" pitchFamily="18" charset="0"/>
-                <a:cs typeface="Times New Roman" pitchFamily="18" charset="0"/>
-              </a:rPr>
-              <a:t> </a:t>
+              <a:rPr lang="pt-BR" sz="2600" b="0" dirty="0" smtClean="0">
+                <a:latin typeface="Times New Roman" pitchFamily="18" charset="0"/>
+                <a:cs typeface="Times New Roman" pitchFamily="18" charset="0"/>
+              </a:rPr>
+              <a:t>assessores </a:t>
             </a:r>
             <a:r>
               <a:rPr lang="pt-BR" sz="2600" b="0" dirty="0" err="1">
@@ -4007,7 +4000,7 @@
               <a:t> </a:t>
             </a:r>
             <a:r>
-              <a:rPr lang="pt-BR" sz="2800" b="1" dirty="0"/>
+              <a:rPr lang="pt-BR" sz="2800" b="1" dirty="0" smtClean="0"/>
               <a:t>- </a:t>
             </a:r>
             <a:r>
@@ -4048,23 +4041,20 @@
           </a:bodyPr>
           <a:lstStyle/>
           <a:p>
-            <a:pPr marL="457200" indent="-457200" algn="just">
-              <a:buFont typeface="Arial" pitchFamily="34" charset="0"/>
-              <a:buChar char="•"/>
-            </a:pPr>
+            <a:pPr algn="just"/>
+            <a:r>
+              <a:rPr lang="pt-BR" sz="2600" b="0" dirty="0" err="1" smtClean="0">
+                <a:latin typeface="Times New Roman" pitchFamily="18" charset="0"/>
+                <a:cs typeface="Times New Roman" pitchFamily="18" charset="0"/>
+              </a:rPr>
+              <a:t>RxJS</a:t>
+            </a:r>
             <a:r>
               <a:rPr lang="pt-BR" sz="2600" b="0" dirty="0" smtClean="0">
                 <a:latin typeface="Times New Roman" pitchFamily="18" charset="0"/>
                 <a:cs typeface="Times New Roman" pitchFamily="18" charset="0"/>
               </a:rPr>
-              <a:t>Exemplo </a:t>
-            </a:r>
-            <a:r>
-              <a:rPr lang="pt-BR" sz="2600" b="0" smtClean="0">
-                <a:latin typeface="Times New Roman" pitchFamily="18" charset="0"/>
-                <a:cs typeface="Times New Roman" pitchFamily="18" charset="0"/>
-              </a:rPr>
-              <a:t>de fixação.</a:t>
+              <a:t> na prática</a:t>
             </a:r>
             <a:endParaRPr lang="pt-BR" sz="2600" b="0" dirty="0">
               <a:latin typeface="Times New Roman" pitchFamily="18" charset="0"/>
@@ -4144,6 +4134,127 @@
           <a:xfrm>
             <a:off x="7156265" y="160338"/>
             <a:ext cx="1317026" cy="1433826"/>
+          </a:xfrm>
+          <a:prstGeom prst="rect">
+            <a:avLst/>
+          </a:prstGeom>
+          <a:noFill/>
+          <a:extLst>
+            <a:ext uri="{909E8E84-426E-40DD-AFC4-6F175D3DCCD1}">
+              <a14:hiddenFill xmlns:a14="http://schemas.microsoft.com/office/drawing/2010/main">
+                <a:solidFill>
+                  <a:srgbClr val="FFFFFF"/>
+                </a:solidFill>
+              </a14:hiddenFill>
+            </a:ext>
+          </a:extLst>
+        </p:spPr>
+      </p:pic>
+      <p:pic>
+        <p:nvPicPr>
+          <p:cNvPr id="1028" name="Picture 4" descr="Resultado de imagem para cogs gif"/>
+          <p:cNvPicPr>
+            <a:picLocks noChangeAspect="1" noChangeArrowheads="1" noCrop="1"/>
+          </p:cNvPicPr>
+          <p:nvPr/>
+        </p:nvPicPr>
+        <p:blipFill>
+          <a:blip r:embed="rId3">
+            <a:extLst>
+              <a:ext uri="{28A0092B-C50C-407E-A947-70E740481C1C}">
+                <a14:useLocalDpi xmlns:a14="http://schemas.microsoft.com/office/drawing/2010/main" val="0"/>
+              </a:ext>
+            </a:extLst>
+          </a:blip>
+          <a:srcRect/>
+          <a:stretch>
+            <a:fillRect/>
+          </a:stretch>
+        </p:blipFill>
+        <p:spPr bwMode="auto">
+          <a:xfrm>
+            <a:off x="6983471" y="1594164"/>
+            <a:ext cx="1662614" cy="1174221"/>
+          </a:xfrm>
+          <a:prstGeom prst="rect">
+            <a:avLst/>
+          </a:prstGeom>
+          <a:noFill/>
+          <a:extLst>
+            <a:ext uri="{909E8E84-426E-40DD-AFC4-6F175D3DCCD1}">
+              <a14:hiddenFill xmlns:a14="http://schemas.microsoft.com/office/drawing/2010/main">
+                <a:solidFill>
+                  <a:srgbClr val="FFFFFF"/>
+                </a:solidFill>
+              </a14:hiddenFill>
+            </a:ext>
+          </a:extLst>
+        </p:spPr>
+      </p:pic>
+      <p:sp>
+        <p:nvSpPr>
+          <p:cNvPr id="8" name="AutoShape 12" descr="Resultado de imagem para observable e promises"/>
+          <p:cNvSpPr>
+            <a:spLocks noChangeAspect="1" noChangeArrowheads="1"/>
+          </p:cNvSpPr>
+          <p:nvPr/>
+        </p:nvSpPr>
+        <p:spPr bwMode="auto">
+          <a:xfrm>
+            <a:off x="155575" y="-144463"/>
+            <a:ext cx="304800" cy="304801"/>
+          </a:xfrm>
+          <a:prstGeom prst="rect">
+            <a:avLst/>
+          </a:prstGeom>
+          <a:noFill/>
+          <a:extLst>
+            <a:ext uri="{909E8E84-426E-40DD-AFC4-6F175D3DCCD1}">
+              <a14:hiddenFill xmlns:a14="http://schemas.microsoft.com/office/drawing/2010/main">
+                <a:solidFill>
+                  <a:srgbClr val="FFFFFF"/>
+                </a:solidFill>
+              </a14:hiddenFill>
+            </a:ext>
+          </a:extLst>
+        </p:spPr>
+        <p:txBody>
+          <a:bodyPr vert="horz" wrap="square" lIns="91440" tIns="45720" rIns="91440" bIns="45720" numCol="1" anchor="t" anchorCtr="0" compatLnSpc="1">
+            <a:prstTxWarp prst="textNoShape">
+              <a:avLst/>
+            </a:prstTxWarp>
+          </a:bodyPr>
+          <a:lstStyle/>
+          <a:p>
+            <a:endParaRPr lang="pt-BR"/>
+          </a:p>
+        </p:txBody>
+      </p:sp>
+      <p:pic>
+        <p:nvPicPr>
+          <p:cNvPr id="1041" name="Picture 17" descr="Imagem relacionada"/>
+          <p:cNvPicPr>
+            <a:picLocks noChangeAspect="1" noChangeArrowheads="1"/>
+          </p:cNvPicPr>
+          <p:nvPr/>
+        </p:nvPicPr>
+        <p:blipFill>
+          <a:blip r:embed="rId4" cstate="print">
+            <a:extLst>
+              <a:ext uri="{28A0092B-C50C-407E-A947-70E740481C1C}">
+                <a14:useLocalDpi xmlns:a14="http://schemas.microsoft.com/office/drawing/2010/main" val="0"/>
+              </a:ext>
+            </a:extLst>
+          </a:blip>
+          <a:srcRect/>
+          <a:stretch>
+            <a:fillRect/>
+          </a:stretch>
+        </p:blipFill>
+        <p:spPr bwMode="auto">
+          <a:xfrm>
+            <a:off x="-4405" y="2996952"/>
+            <a:ext cx="9011425" cy="3861048"/>
           </a:xfrm>
           <a:prstGeom prst="rect">
             <a:avLst/>
@@ -5173,199 +5284,6 @@
         </p:nvSpPr>
         <p:spPr>
           <a:xfrm>
-            <a:off x="251519" y="323403"/>
-            <a:ext cx="6840761" cy="903630"/>
-          </a:xfrm>
-        </p:spPr>
-        <p:txBody>
-          <a:bodyPr>
-            <a:noAutofit/>
-          </a:bodyPr>
-          <a:lstStyle/>
-          <a:p>
-            <a:r>
-              <a:rPr lang="pt-BR" sz="2800" b="1" dirty="0"/>
-              <a:t>REALIZANDO UM CRUD</a:t>
-            </a:r>
-          </a:p>
-        </p:txBody>
-      </p:sp>
-      <p:sp>
-        <p:nvSpPr>
-          <p:cNvPr id="3" name="Espaço Reservado para Conteúdo 2"/>
-          <p:cNvSpPr>
-            <a:spLocks noGrp="1"/>
-          </p:cNvSpPr>
-          <p:nvPr>
-            <p:ph idx="1"/>
-          </p:nvPr>
-        </p:nvSpPr>
-        <p:spPr>
-          <a:xfrm>
-            <a:off x="395536" y="1844824"/>
-            <a:ext cx="8077755" cy="3960440"/>
-          </a:xfrm>
-        </p:spPr>
-        <p:txBody>
-          <a:bodyPr>
-            <a:noAutofit/>
-          </a:bodyPr>
-          <a:lstStyle/>
-          <a:p>
-            <a:endParaRPr lang="pt-BR" sz="1600" b="0" dirty="0">
-              <a:latin typeface="Times New Roman" pitchFamily="18" charset="0"/>
-              <a:cs typeface="Times New Roman" pitchFamily="18" charset="0"/>
-            </a:endParaRPr>
-          </a:p>
-          <a:p>
-            <a:pPr marL="457200" indent="-457200">
-              <a:buFont typeface="Arial" pitchFamily="34" charset="0"/>
-              <a:buChar char="•"/>
-            </a:pPr>
-            <a:r>
-              <a:rPr lang="pt-BR" sz="2800" b="0" dirty="0" smtClean="0">
-                <a:latin typeface="Times New Roman" pitchFamily="18" charset="0"/>
-                <a:cs typeface="Times New Roman" pitchFamily="18" charset="0"/>
-              </a:rPr>
-              <a:t>Realizar </a:t>
-            </a:r>
-            <a:r>
-              <a:rPr lang="pt-BR" sz="2800" b="0" dirty="0">
-                <a:latin typeface="Times New Roman" pitchFamily="18" charset="0"/>
-                <a:cs typeface="Times New Roman" pitchFamily="18" charset="0"/>
-              </a:rPr>
-              <a:t>Exercício 3 da lista de exercícios</a:t>
-            </a:r>
-          </a:p>
-          <a:p>
-            <a:endParaRPr lang="pt-BR" sz="2800" dirty="0"/>
-          </a:p>
-          <a:p>
-            <a:endParaRPr lang="pt-BR" sz="2600" dirty="0"/>
-          </a:p>
-        </p:txBody>
-      </p:sp>
-      <p:cxnSp>
-        <p:nvCxnSpPr>
-          <p:cNvPr id="5" name="Conector reto 4"/>
-          <p:cNvCxnSpPr/>
-          <p:nvPr/>
-        </p:nvCxnSpPr>
-        <p:spPr>
-          <a:xfrm>
-            <a:off x="251520" y="1340768"/>
-            <a:ext cx="6480720" cy="0"/>
-          </a:xfrm>
-          <a:prstGeom prst="line">
-            <a:avLst/>
-          </a:prstGeom>
-          <a:ln/>
-        </p:spPr>
-        <p:style>
-          <a:lnRef idx="2">
-            <a:schemeClr val="accent5"/>
-          </a:lnRef>
-          <a:fillRef idx="0">
-            <a:schemeClr val="accent5"/>
-          </a:fillRef>
-          <a:effectRef idx="1">
-            <a:schemeClr val="accent5"/>
-          </a:effectRef>
-          <a:fontRef idx="minor">
-            <a:schemeClr val="tx1"/>
-          </a:fontRef>
-        </p:style>
-      </p:cxnSp>
-      <p:pic>
-        <p:nvPicPr>
-          <p:cNvPr id="1028" name="Picture 4" descr="C:\Users\User\Desktop\Apresentação\Imagens\gif\27637937-cb4b9b24-5c11-11e7-949b-15c1e4cdb53c.gif"/>
-          <p:cNvPicPr>
-            <a:picLocks noChangeAspect="1" noChangeArrowheads="1" noCrop="1"/>
-          </p:cNvPicPr>
-          <p:nvPr/>
-        </p:nvPicPr>
-        <p:blipFill>
-          <a:blip r:embed="rId2">
-            <a:extLst>
-              <a:ext uri="{28A0092B-C50C-407E-A947-70E740481C1C}">
-                <a14:useLocalDpi xmlns:a14="http://schemas.microsoft.com/office/drawing/2010/main" val="0"/>
-              </a:ext>
-            </a:extLst>
-          </a:blip>
-          <a:srcRect/>
-          <a:stretch>
-            <a:fillRect/>
-          </a:stretch>
-        </p:blipFill>
-        <p:spPr bwMode="auto">
-          <a:xfrm>
-            <a:off x="6957887" y="-27384"/>
-            <a:ext cx="1728193" cy="1741909"/>
-          </a:xfrm>
-          <a:prstGeom prst="rect">
-            <a:avLst/>
-          </a:prstGeom>
-          <a:noFill/>
-          <a:extLst>
-            <a:ext uri="{909E8E84-426E-40DD-AFC4-6F175D3DCCD1}">
-              <a14:hiddenFill xmlns:a14="http://schemas.microsoft.com/office/drawing/2010/main">
-                <a:solidFill>
-                  <a:srgbClr val="FFFFFF"/>
-                </a:solidFill>
-              </a14:hiddenFill>
-            </a:ext>
-          </a:extLst>
-        </p:spPr>
-      </p:pic>
-    </p:spTree>
-    <p:extLst>
-      <p:ext uri="{BB962C8B-B14F-4D97-AF65-F5344CB8AC3E}">
-        <p14:creationId xmlns:p14="http://schemas.microsoft.com/office/powerpoint/2010/main" val="403429108"/>
-      </p:ext>
-    </p:extLst>
-  </p:cSld>
-  <p:clrMapOvr>
-    <a:masterClrMapping/>
-  </p:clrMapOvr>
-  <p:timing>
-    <p:tnLst>
-      <p:par>
-        <p:cTn id="1" dur="indefinite" restart="never" nodeType="tmRoot"/>
-      </p:par>
-    </p:tnLst>
-  </p:timing>
-</p:sld>
-</file>
-
-<file path=ppt/slides/slide17.xml><?xml version="1.0" encoding="utf-8"?>
-<p:sld xmlns:a="http://schemas.openxmlformats.org/drawingml/2006/main" xmlns:r="http://schemas.openxmlformats.org/officeDocument/2006/relationships" xmlns:p="http://schemas.openxmlformats.org/presentationml/2006/main">
-  <p:cSld>
-    <p:spTree>
-      <p:nvGrpSpPr>
-        <p:cNvPr id="1" name=""/>
-        <p:cNvGrpSpPr/>
-        <p:nvPr/>
-      </p:nvGrpSpPr>
-      <p:grpSpPr>
-        <a:xfrm>
-          <a:off x="0" y="0"/>
-          <a:ext cx="0" cy="0"/>
-          <a:chOff x="0" y="0"/>
-          <a:chExt cx="0" cy="0"/>
-        </a:xfrm>
-      </p:grpSpPr>
-      <p:sp>
-        <p:nvSpPr>
-          <p:cNvPr id="2" name="Título 1"/>
-          <p:cNvSpPr>
-            <a:spLocks noGrp="1"/>
-          </p:cNvSpPr>
-          <p:nvPr>
-            <p:ph type="title"/>
-          </p:nvPr>
-        </p:nvSpPr>
-        <p:spPr>
-          <a:xfrm>
             <a:off x="322059" y="3140968"/>
             <a:ext cx="8363272" cy="2844234"/>
           </a:xfrm>
@@ -5565,7 +5483,7 @@
 </p:sld>
 </file>
 
-<file path=ppt/slides/slide18.xml><?xml version="1.0" encoding="utf-8"?>
+<file path=ppt/slides/slide17.xml><?xml version="1.0" encoding="utf-8"?>
 <p:sld xmlns:a="http://schemas.openxmlformats.org/drawingml/2006/main" xmlns:r="http://schemas.openxmlformats.org/officeDocument/2006/relationships" xmlns:p="http://schemas.openxmlformats.org/presentationml/2006/main">
   <p:cSld>
     <p:spTree>
@@ -5908,7 +5826,7 @@
 </p:sld>
 </file>
 
-<file path=ppt/slides/slide19.xml><?xml version="1.0" encoding="utf-8"?>
+<file path=ppt/slides/slide18.xml><?xml version="1.0" encoding="utf-8"?>
 <p:sld xmlns:a="http://schemas.openxmlformats.org/drawingml/2006/main" xmlns:r="http://schemas.openxmlformats.org/officeDocument/2006/relationships" xmlns:p="http://schemas.openxmlformats.org/presentationml/2006/main">
   <p:cSld>
     <p:spTree>
@@ -6377,6 +6295,637 @@
     <p:extLst>
       <p:ext uri="{BB962C8B-B14F-4D97-AF65-F5344CB8AC3E}">
         <p14:creationId xmlns:p14="http://schemas.microsoft.com/office/powerpoint/2010/main" val="403429108"/>
+      </p:ext>
+    </p:extLst>
+  </p:cSld>
+  <p:clrMapOvr>
+    <a:masterClrMapping/>
+  </p:clrMapOvr>
+  <p:timing>
+    <p:tnLst>
+      <p:par>
+        <p:cTn id="1" dur="indefinite" restart="never" nodeType="tmRoot"/>
+      </p:par>
+    </p:tnLst>
+  </p:timing>
+</p:sld>
+</file>
+
+<file path=ppt/slides/slide19.xml><?xml version="1.0" encoding="utf-8"?>
+<p:sld xmlns:a="http://schemas.openxmlformats.org/drawingml/2006/main" xmlns:r="http://schemas.openxmlformats.org/officeDocument/2006/relationships" xmlns:p="http://schemas.openxmlformats.org/presentationml/2006/main">
+  <p:cSld>
+    <p:spTree>
+      <p:nvGrpSpPr>
+        <p:cNvPr id="1" name=""/>
+        <p:cNvGrpSpPr/>
+        <p:nvPr/>
+      </p:nvGrpSpPr>
+      <p:grpSpPr>
+        <a:xfrm>
+          <a:off x="0" y="0"/>
+          <a:ext cx="0" cy="0"/>
+          <a:chOff x="0" y="0"/>
+          <a:chExt cx="0" cy="0"/>
+        </a:xfrm>
+      </p:grpSpPr>
+      <p:sp>
+        <p:nvSpPr>
+          <p:cNvPr id="2" name="Título 1"/>
+          <p:cNvSpPr>
+            <a:spLocks noGrp="1"/>
+          </p:cNvSpPr>
+          <p:nvPr>
+            <p:ph type="title"/>
+          </p:nvPr>
+        </p:nvSpPr>
+        <p:spPr>
+          <a:xfrm>
+            <a:off x="251521" y="323403"/>
+            <a:ext cx="6480720" cy="903630"/>
+          </a:xfrm>
+        </p:spPr>
+        <p:txBody>
+          <a:bodyPr>
+            <a:noAutofit/>
+          </a:bodyPr>
+          <a:lstStyle/>
+          <a:p>
+            <a:pPr algn="ctr"/>
+            <a:r>
+              <a:rPr lang="pt-BR" sz="2800" b="1" dirty="0"/>
+              <a:t>IMPORTANDO O </a:t>
+            </a:r>
+            <a:r>
+              <a:rPr lang="pt-BR" sz="2800" b="1" dirty="0" smtClean="0"/>
+              <a:t>PRIMENG</a:t>
+            </a:r>
+            <a:br>
+              <a:rPr lang="pt-BR" sz="2800" b="1" dirty="0" smtClean="0"/>
+            </a:br>
+            <a:r>
+              <a:rPr lang="pt-BR" sz="2800" b="1" dirty="0" smtClean="0"/>
+              <a:t> </a:t>
+            </a:r>
+            <a:r>
+              <a:rPr lang="pt-BR" sz="2800" b="1" dirty="0"/>
+              <a:t>EM NOSSO PROJETO</a:t>
+            </a:r>
+          </a:p>
+        </p:txBody>
+      </p:sp>
+      <p:sp>
+        <p:nvSpPr>
+          <p:cNvPr id="3" name="Espaço Reservado para Conteúdo 2"/>
+          <p:cNvSpPr>
+            <a:spLocks noGrp="1"/>
+          </p:cNvSpPr>
+          <p:nvPr>
+            <p:ph idx="1"/>
+          </p:nvPr>
+        </p:nvSpPr>
+        <p:spPr>
+          <a:xfrm>
+            <a:off x="395536" y="1844824"/>
+            <a:ext cx="8077755" cy="3960440"/>
+          </a:xfrm>
+        </p:spPr>
+        <p:txBody>
+          <a:bodyPr>
+            <a:noAutofit/>
+          </a:bodyPr>
+          <a:lstStyle/>
+          <a:p>
+            <a:endParaRPr lang="pt-BR" sz="2600" dirty="0"/>
+          </a:p>
+          <a:p>
+            <a:endParaRPr lang="pt-BR" sz="2600" dirty="0"/>
+          </a:p>
+        </p:txBody>
+      </p:sp>
+      <p:cxnSp>
+        <p:nvCxnSpPr>
+          <p:cNvPr id="5" name="Conector reto 4"/>
+          <p:cNvCxnSpPr/>
+          <p:nvPr/>
+        </p:nvCxnSpPr>
+        <p:spPr>
+          <a:xfrm>
+            <a:off x="251520" y="1340768"/>
+            <a:ext cx="6480720" cy="0"/>
+          </a:xfrm>
+          <a:prstGeom prst="line">
+            <a:avLst/>
+          </a:prstGeom>
+          <a:ln/>
+        </p:spPr>
+        <p:style>
+          <a:lnRef idx="2">
+            <a:schemeClr val="accent5"/>
+          </a:lnRef>
+          <a:fillRef idx="0">
+            <a:schemeClr val="accent5"/>
+          </a:fillRef>
+          <a:effectRef idx="1">
+            <a:schemeClr val="accent5"/>
+          </a:effectRef>
+          <a:fontRef idx="minor">
+            <a:schemeClr val="tx1"/>
+          </a:fontRef>
+        </p:style>
+      </p:cxnSp>
+      <p:pic>
+        <p:nvPicPr>
+          <p:cNvPr id="6" name="Picture 7" descr="Angular-Logo-PNG-Image.png"/>
+          <p:cNvPicPr>
+            <a:picLocks noChangeAspect="1" noChangeArrowheads="1"/>
+          </p:cNvPicPr>
+          <p:nvPr/>
+        </p:nvPicPr>
+        <p:blipFill rotWithShape="1">
+          <a:blip r:embed="rId2" cstate="print">
+            <a:extLst>
+              <a:ext uri="{28A0092B-C50C-407E-A947-70E740481C1C}">
+                <a14:useLocalDpi xmlns:a14="http://schemas.microsoft.com/office/drawing/2010/main" val="0"/>
+              </a:ext>
+            </a:extLst>
+          </a:blip>
+          <a:srcRect l="2299" t="36731" r="73370" b="36781"/>
+          <a:stretch/>
+        </p:blipFill>
+        <p:spPr bwMode="auto">
+          <a:xfrm>
+            <a:off x="7156265" y="160338"/>
+            <a:ext cx="1317026" cy="1433826"/>
+          </a:xfrm>
+          <a:prstGeom prst="rect">
+            <a:avLst/>
+          </a:prstGeom>
+          <a:noFill/>
+          <a:extLst>
+            <a:ext uri="{909E8E84-426E-40DD-AFC4-6F175D3DCCD1}">
+              <a14:hiddenFill xmlns:a14="http://schemas.microsoft.com/office/drawing/2010/main">
+                <a:solidFill>
+                  <a:srgbClr val="FFFFFF"/>
+                </a:solidFill>
+              </a14:hiddenFill>
+            </a:ext>
+          </a:extLst>
+        </p:spPr>
+      </p:pic>
+      <p:sp>
+        <p:nvSpPr>
+          <p:cNvPr id="7" name="Espaço Reservado para Conteúdo 2"/>
+          <p:cNvSpPr txBox="1">
+            <a:spLocks/>
+          </p:cNvSpPr>
+          <p:nvPr/>
+        </p:nvSpPr>
+        <p:spPr>
+          <a:xfrm>
+            <a:off x="251521" y="1700808"/>
+            <a:ext cx="8221770" cy="3960440"/>
+          </a:xfrm>
+          <a:prstGeom prst="rect">
+            <a:avLst/>
+          </a:prstGeom>
+        </p:spPr>
+        <p:txBody>
+          <a:bodyPr vert="horz" lIns="91440" tIns="45720" rIns="91440" bIns="45720" rtlCol="0">
+            <a:noAutofit/>
+          </a:bodyPr>
+          <a:lstStyle>
+            <a:lvl1pPr marL="0" indent="0" algn="l" defTabSz="914400" rtl="0" eaLnBrk="1" latinLnBrk="0" hangingPunct="1">
+              <a:spcBef>
+                <a:spcPct val="20000"/>
+              </a:spcBef>
+              <a:spcAft>
+                <a:spcPts val="600"/>
+              </a:spcAft>
+              <a:buFont typeface="Arial" pitchFamily="34" charset="0"/>
+              <a:buNone/>
+              <a:defRPr sz="2000" b="1" kern="1200">
+                <a:solidFill>
+                  <a:schemeClr val="tx1"/>
+                </a:solidFill>
+                <a:latin typeface="+mn-lt"/>
+                <a:ea typeface="+mn-ea"/>
+                <a:cs typeface="+mn-cs"/>
+              </a:defRPr>
+            </a:lvl1pPr>
+            <a:lvl2pPr marL="457200" indent="-182880" algn="l" defTabSz="914400" rtl="0" eaLnBrk="1" latinLnBrk="0" hangingPunct="1">
+              <a:spcBef>
+                <a:spcPct val="20000"/>
+              </a:spcBef>
+              <a:buClr>
+                <a:schemeClr val="tx2"/>
+              </a:buClr>
+              <a:buFont typeface="Arial" pitchFamily="34" charset="0"/>
+              <a:buChar char="•"/>
+              <a:defRPr sz="2000" kern="1200">
+                <a:solidFill>
+                  <a:schemeClr val="tx1"/>
+                </a:solidFill>
+                <a:latin typeface="+mn-lt"/>
+                <a:ea typeface="+mn-ea"/>
+                <a:cs typeface="+mn-cs"/>
+              </a:defRPr>
+            </a:lvl2pPr>
+            <a:lvl3pPr marL="1143000" indent="-228600" algn="l" defTabSz="914400" rtl="0" eaLnBrk="1" latinLnBrk="0" hangingPunct="1">
+              <a:spcBef>
+                <a:spcPct val="20000"/>
+              </a:spcBef>
+              <a:buClr>
+                <a:schemeClr val="tx2"/>
+              </a:buClr>
+              <a:buFont typeface="Arial" pitchFamily="34" charset="0"/>
+              <a:buChar char="•"/>
+              <a:defRPr sz="1800" kern="1200">
+                <a:solidFill>
+                  <a:schemeClr val="tx1"/>
+                </a:solidFill>
+                <a:latin typeface="+mn-lt"/>
+                <a:ea typeface="+mn-ea"/>
+                <a:cs typeface="+mn-cs"/>
+              </a:defRPr>
+            </a:lvl3pPr>
+            <a:lvl4pPr marL="1600200" indent="-228600" algn="l" defTabSz="914400" rtl="0" eaLnBrk="1" latinLnBrk="0" hangingPunct="1">
+              <a:spcBef>
+                <a:spcPct val="20000"/>
+              </a:spcBef>
+              <a:buClr>
+                <a:schemeClr val="tx2"/>
+              </a:buClr>
+              <a:buFont typeface="Arial" pitchFamily="34" charset="0"/>
+              <a:buChar char="•"/>
+              <a:defRPr sz="1800" kern="1200">
+                <a:solidFill>
+                  <a:schemeClr val="tx1"/>
+                </a:solidFill>
+                <a:latin typeface="+mn-lt"/>
+                <a:ea typeface="+mn-ea"/>
+                <a:cs typeface="+mn-cs"/>
+              </a:defRPr>
+            </a:lvl4pPr>
+            <a:lvl5pPr marL="2057400" indent="-228600" algn="l" defTabSz="914400" rtl="0" eaLnBrk="1" latinLnBrk="0" hangingPunct="1">
+              <a:spcBef>
+                <a:spcPct val="20000"/>
+              </a:spcBef>
+              <a:buClr>
+                <a:schemeClr val="tx2"/>
+              </a:buClr>
+              <a:buFont typeface="Arial" pitchFamily="34" charset="0"/>
+              <a:buChar char="•"/>
+              <a:defRPr sz="1800" kern="1200" baseline="0">
+                <a:solidFill>
+                  <a:schemeClr val="tx1"/>
+                </a:solidFill>
+                <a:latin typeface="+mn-lt"/>
+                <a:ea typeface="+mn-ea"/>
+                <a:cs typeface="+mn-cs"/>
+              </a:defRPr>
+            </a:lvl5pPr>
+            <a:lvl6pPr marL="2514600" indent="-228600" algn="l" defTabSz="914400" rtl="0" eaLnBrk="1" latinLnBrk="0" hangingPunct="1">
+              <a:spcBef>
+                <a:spcPct val="20000"/>
+              </a:spcBef>
+              <a:buClr>
+                <a:schemeClr val="tx2"/>
+              </a:buClr>
+              <a:buFont typeface="Arial" pitchFamily="34" charset="0"/>
+              <a:buChar char="•"/>
+              <a:defRPr sz="1600" kern="1200">
+                <a:solidFill>
+                  <a:schemeClr val="tx1"/>
+                </a:solidFill>
+                <a:latin typeface="+mn-lt"/>
+                <a:ea typeface="+mn-ea"/>
+                <a:cs typeface="+mn-cs"/>
+              </a:defRPr>
+            </a:lvl6pPr>
+            <a:lvl7pPr marL="2971800" indent="-228600" algn="l" defTabSz="914400" rtl="0" eaLnBrk="1" latinLnBrk="0" hangingPunct="1">
+              <a:spcBef>
+                <a:spcPct val="20000"/>
+              </a:spcBef>
+              <a:buClr>
+                <a:schemeClr val="tx2"/>
+              </a:buClr>
+              <a:buFont typeface="Arial" pitchFamily="34" charset="0"/>
+              <a:buChar char="•"/>
+              <a:defRPr sz="1600" kern="1200">
+                <a:solidFill>
+                  <a:schemeClr val="tx1"/>
+                </a:solidFill>
+                <a:latin typeface="+mn-lt"/>
+                <a:ea typeface="+mn-ea"/>
+                <a:cs typeface="+mn-cs"/>
+              </a:defRPr>
+            </a:lvl7pPr>
+            <a:lvl8pPr marL="3429000" indent="-228600" algn="l" defTabSz="914400" rtl="0" eaLnBrk="1" latinLnBrk="0" hangingPunct="1">
+              <a:spcBef>
+                <a:spcPct val="20000"/>
+              </a:spcBef>
+              <a:buClr>
+                <a:schemeClr val="tx2"/>
+              </a:buClr>
+              <a:buFont typeface="Arial" pitchFamily="34" charset="0"/>
+              <a:buChar char="•"/>
+              <a:defRPr sz="1600" kern="1200">
+                <a:solidFill>
+                  <a:schemeClr val="tx1"/>
+                </a:solidFill>
+                <a:latin typeface="+mn-lt"/>
+                <a:ea typeface="+mn-ea"/>
+                <a:cs typeface="+mn-cs"/>
+              </a:defRPr>
+            </a:lvl8pPr>
+            <a:lvl9pPr marL="3886200" indent="-228600" algn="l" defTabSz="914400" rtl="0" eaLnBrk="1" latinLnBrk="0" hangingPunct="1">
+              <a:spcBef>
+                <a:spcPct val="20000"/>
+              </a:spcBef>
+              <a:buClr>
+                <a:schemeClr val="tx2"/>
+              </a:buClr>
+              <a:buFont typeface="Arial" pitchFamily="34" charset="0"/>
+              <a:buChar char="•"/>
+              <a:defRPr sz="1600" kern="1200">
+                <a:solidFill>
+                  <a:schemeClr val="tx1"/>
+                </a:solidFill>
+                <a:latin typeface="+mn-lt"/>
+                <a:ea typeface="+mn-ea"/>
+                <a:cs typeface="+mn-cs"/>
+              </a:defRPr>
+            </a:lvl9pPr>
+          </a:lstStyle>
+          <a:p>
+            <a:r>
+              <a:rPr lang="pt-BR" sz="2800" dirty="0" smtClean="0">
+                <a:latin typeface="Times New Roman" pitchFamily="18" charset="0"/>
+                <a:cs typeface="Times New Roman" pitchFamily="18" charset="0"/>
+              </a:rPr>
+              <a:t>Segundo passo:</a:t>
+            </a:r>
+            <a:endParaRPr lang="pt-BR" sz="2800" dirty="0">
+              <a:latin typeface="Times New Roman" pitchFamily="18" charset="0"/>
+              <a:cs typeface="Times New Roman" pitchFamily="18" charset="0"/>
+            </a:endParaRPr>
+          </a:p>
+          <a:p>
+            <a:pPr algn="just">
+              <a:spcBef>
+                <a:spcPts val="0"/>
+              </a:spcBef>
+            </a:pPr>
+            <a:r>
+              <a:rPr lang="pt-BR" sz="2800" b="0" dirty="0" smtClean="0">
+                <a:latin typeface="Times New Roman" pitchFamily="18" charset="0"/>
+                <a:cs typeface="Times New Roman" pitchFamily="18" charset="0"/>
+              </a:rPr>
+              <a:t>Importar </a:t>
+            </a:r>
+            <a:r>
+              <a:rPr lang="pt-BR" sz="2800" b="0" dirty="0">
+                <a:latin typeface="Times New Roman" pitchFamily="18" charset="0"/>
+                <a:cs typeface="Times New Roman" pitchFamily="18" charset="0"/>
+              </a:rPr>
+              <a:t>as dependências do </a:t>
+            </a:r>
+            <a:r>
+              <a:rPr lang="pt-BR" sz="2800" b="0" dirty="0" err="1">
+                <a:latin typeface="Times New Roman" pitchFamily="18" charset="0"/>
+                <a:cs typeface="Times New Roman" pitchFamily="18" charset="0"/>
+              </a:rPr>
+              <a:t>PrimeNG</a:t>
+            </a:r>
+            <a:r>
+              <a:rPr lang="pt-BR" sz="2800" b="0" dirty="0">
+                <a:latin typeface="Times New Roman" pitchFamily="18" charset="0"/>
+                <a:cs typeface="Times New Roman" pitchFamily="18" charset="0"/>
+              </a:rPr>
+              <a:t> no </a:t>
+            </a:r>
+            <a:r>
+              <a:rPr lang="pt-BR" sz="2800" b="0" dirty="0" err="1">
+                <a:latin typeface="Times New Roman" pitchFamily="18" charset="0"/>
+                <a:cs typeface="Times New Roman" pitchFamily="18" charset="0"/>
+              </a:rPr>
+              <a:t>package</a:t>
+            </a:r>
+            <a:r>
+              <a:rPr lang="pt-BR" sz="2800" b="0" dirty="0">
+                <a:latin typeface="Times New Roman" pitchFamily="18" charset="0"/>
+                <a:cs typeface="Times New Roman" pitchFamily="18" charset="0"/>
+              </a:rPr>
+              <a:t> </a:t>
+            </a:r>
+            <a:r>
+              <a:rPr lang="pt-BR" sz="2800" b="0" dirty="0" err="1">
+                <a:latin typeface="Times New Roman" pitchFamily="18" charset="0"/>
+                <a:cs typeface="Times New Roman" pitchFamily="18" charset="0"/>
+              </a:rPr>
+              <a:t>json</a:t>
+            </a:r>
+            <a:r>
+              <a:rPr lang="pt-BR" sz="2800" b="0" dirty="0">
+                <a:latin typeface="Times New Roman" pitchFamily="18" charset="0"/>
+                <a:cs typeface="Times New Roman" pitchFamily="18" charset="0"/>
+              </a:rPr>
+              <a:t> e declarar nos </a:t>
+            </a:r>
+            <a:r>
+              <a:rPr lang="pt-BR" sz="2800" b="0" dirty="0" err="1">
+                <a:latin typeface="Times New Roman" pitchFamily="18" charset="0"/>
+                <a:cs typeface="Times New Roman" pitchFamily="18" charset="0"/>
+              </a:rPr>
+              <a:t>assets</a:t>
+            </a:r>
+            <a:r>
+              <a:rPr lang="pt-BR" sz="2800" b="0" dirty="0">
+                <a:latin typeface="Times New Roman" pitchFamily="18" charset="0"/>
+                <a:cs typeface="Times New Roman" pitchFamily="18" charset="0"/>
+              </a:rPr>
+              <a:t> os </a:t>
+            </a:r>
+            <a:r>
+              <a:rPr lang="pt-BR" sz="2800" b="0" dirty="0" err="1">
+                <a:latin typeface="Times New Roman" pitchFamily="18" charset="0"/>
+                <a:cs typeface="Times New Roman" pitchFamily="18" charset="0"/>
+              </a:rPr>
+              <a:t>styles</a:t>
+            </a:r>
+            <a:r>
+              <a:rPr lang="pt-BR" sz="2800" b="0" dirty="0">
+                <a:latin typeface="Times New Roman" pitchFamily="18" charset="0"/>
+                <a:cs typeface="Times New Roman" pitchFamily="18" charset="0"/>
+              </a:rPr>
+              <a:t> do </a:t>
+            </a:r>
+            <a:r>
+              <a:rPr lang="pt-BR" sz="2800" b="0" dirty="0" err="1" smtClean="0">
+                <a:latin typeface="Times New Roman" pitchFamily="18" charset="0"/>
+                <a:cs typeface="Times New Roman" pitchFamily="18" charset="0"/>
+              </a:rPr>
+              <a:t>PrimeNG</a:t>
+            </a:r>
+            <a:r>
+              <a:rPr lang="pt-BR" sz="2800" b="0" dirty="0" smtClean="0">
+                <a:latin typeface="Times New Roman" pitchFamily="18" charset="0"/>
+                <a:cs typeface="Times New Roman" pitchFamily="18" charset="0"/>
+              </a:rPr>
+              <a:t>. </a:t>
+            </a:r>
+          </a:p>
+          <a:p>
+            <a:pPr algn="just">
+              <a:spcBef>
+                <a:spcPts val="0"/>
+              </a:spcBef>
+            </a:pPr>
+            <a:r>
+              <a:rPr lang="pt-BR" sz="2800" b="0" dirty="0" smtClean="0">
+                <a:latin typeface="Times New Roman" pitchFamily="18" charset="0"/>
+                <a:cs typeface="Times New Roman" pitchFamily="18" charset="0"/>
+              </a:rPr>
+              <a:t>Se </a:t>
+            </a:r>
+            <a:r>
+              <a:rPr lang="pt-BR" sz="2800" b="0" dirty="0">
+                <a:latin typeface="Times New Roman" pitchFamily="18" charset="0"/>
+                <a:cs typeface="Times New Roman" pitchFamily="18" charset="0"/>
+              </a:rPr>
+              <a:t>caso em nosso </a:t>
+            </a:r>
+            <a:r>
+              <a:rPr lang="pt-BR" sz="2800" b="0" dirty="0" err="1">
+                <a:latin typeface="Times New Roman" pitchFamily="18" charset="0"/>
+                <a:cs typeface="Times New Roman" pitchFamily="18" charset="0"/>
+              </a:rPr>
+              <a:t>package.json</a:t>
+            </a:r>
+            <a:r>
+              <a:rPr lang="pt-BR" sz="2800" b="0" dirty="0">
+                <a:latin typeface="Times New Roman" pitchFamily="18" charset="0"/>
+                <a:cs typeface="Times New Roman" pitchFamily="18" charset="0"/>
+              </a:rPr>
+              <a:t> não ter sido gravadas as declarações das dependências do </a:t>
+            </a:r>
+            <a:r>
+              <a:rPr lang="pt-BR" sz="2800" b="0" dirty="0" err="1">
+                <a:latin typeface="Times New Roman" pitchFamily="18" charset="0"/>
+                <a:cs typeface="Times New Roman" pitchFamily="18" charset="0"/>
+              </a:rPr>
+              <a:t>PrimeNG</a:t>
+            </a:r>
+            <a:r>
+              <a:rPr lang="pt-BR" sz="2800" b="0" dirty="0">
+                <a:latin typeface="Times New Roman" pitchFamily="18" charset="0"/>
+                <a:cs typeface="Times New Roman" pitchFamily="18" charset="0"/>
+              </a:rPr>
+              <a:t>, devemos </a:t>
+            </a:r>
+            <a:r>
+              <a:rPr lang="pt-BR" sz="2800" b="0" dirty="0" smtClean="0">
+                <a:latin typeface="Times New Roman" pitchFamily="18" charset="0"/>
+                <a:cs typeface="Times New Roman" pitchFamily="18" charset="0"/>
+              </a:rPr>
+              <a:t>adicioná-las </a:t>
+            </a:r>
+            <a:r>
+              <a:rPr lang="pt-BR" sz="2800" b="0" dirty="0">
+                <a:latin typeface="Times New Roman" pitchFamily="18" charset="0"/>
+                <a:cs typeface="Times New Roman" pitchFamily="18" charset="0"/>
+              </a:rPr>
+              <a:t>dentro de </a:t>
+            </a:r>
+            <a:r>
+              <a:rPr lang="pt-BR" sz="2800" b="0" dirty="0" err="1">
+                <a:latin typeface="Times New Roman" pitchFamily="18" charset="0"/>
+                <a:cs typeface="Times New Roman" pitchFamily="18" charset="0"/>
+              </a:rPr>
+              <a:t>dependencies</a:t>
+            </a:r>
+            <a:r>
+              <a:rPr lang="pt-BR" sz="2800" b="0" dirty="0">
+                <a:latin typeface="Times New Roman" pitchFamily="18" charset="0"/>
+                <a:cs typeface="Times New Roman" pitchFamily="18" charset="0"/>
+              </a:rPr>
+              <a:t>:</a:t>
+            </a:r>
+          </a:p>
+          <a:p>
+            <a:endParaRPr lang="pt-BR" sz="2800" dirty="0" smtClean="0"/>
+          </a:p>
+          <a:p>
+            <a:endParaRPr lang="pt-BR" sz="2600" dirty="0"/>
+          </a:p>
+        </p:txBody>
+      </p:sp>
+      <p:pic>
+        <p:nvPicPr>
+          <p:cNvPr id="1026" name="Picture 2"/>
+          <p:cNvPicPr>
+            <a:picLocks noChangeAspect="1" noChangeArrowheads="1"/>
+          </p:cNvPicPr>
+          <p:nvPr/>
+        </p:nvPicPr>
+        <p:blipFill rotWithShape="1">
+          <a:blip r:embed="rId3">
+            <a:extLst>
+              <a:ext uri="{28A0092B-C50C-407E-A947-70E740481C1C}">
+                <a14:useLocalDpi xmlns:a14="http://schemas.microsoft.com/office/drawing/2010/main" val="0"/>
+              </a:ext>
+            </a:extLst>
+          </a:blip>
+          <a:srcRect l="22745" t="48091" r="10532" b="15776"/>
+          <a:stretch/>
+        </p:blipFill>
+        <p:spPr bwMode="auto">
+          <a:xfrm>
+            <a:off x="1115616" y="4564977"/>
+            <a:ext cx="6624736" cy="2025945"/>
+          </a:xfrm>
+          <a:prstGeom prst="rect">
+            <a:avLst/>
+          </a:prstGeom>
+          <a:noFill/>
+          <a:ln>
+            <a:noFill/>
+          </a:ln>
+          <a:effectLst/>
+          <a:extLst>
+            <a:ext uri="{909E8E84-426E-40DD-AFC4-6F175D3DCCD1}">
+              <a14:hiddenFill xmlns:a14="http://schemas.microsoft.com/office/drawing/2010/main">
+                <a:solidFill>
+                  <a:schemeClr val="accent1"/>
+                </a:solidFill>
+              </a14:hiddenFill>
+            </a:ext>
+            <a:ext uri="{91240B29-F687-4F45-9708-019B960494DF}">
+              <a14:hiddenLine xmlns:a14="http://schemas.microsoft.com/office/drawing/2010/main" w="9525">
+                <a:solidFill>
+                  <a:schemeClr val="tx1"/>
+                </a:solidFill>
+                <a:miter lim="800000"/>
+                <a:headEnd/>
+                <a:tailEnd/>
+              </a14:hiddenLine>
+            </a:ext>
+            <a:ext uri="{AF507438-7753-43E0-B8FC-AC1667EBCBE1}">
+              <a14:hiddenEffects xmlns:a14="http://schemas.microsoft.com/office/drawing/2010/main">
+                <a:effectLst>
+                  <a:outerShdw dist="35921" dir="2700000" algn="ctr" rotWithShape="0">
+                    <a:schemeClr val="bg2"/>
+                  </a:outerShdw>
+                </a:effectLst>
+              </a14:hiddenEffects>
+            </a:ext>
+          </a:extLst>
+        </p:spPr>
+      </p:pic>
+    </p:spTree>
+    <p:extLst>
+      <p:ext uri="{BB962C8B-B14F-4D97-AF65-F5344CB8AC3E}">
+        <p14:creationId xmlns:p14="http://schemas.microsoft.com/office/powerpoint/2010/main" val="90333842"/>
       </p:ext>
     </p:extLst>
   </p:cSld>
@@ -6868,8 +7417,8 @@
         </p:nvSpPr>
         <p:spPr>
           <a:xfrm>
-            <a:off x="251521" y="1700808"/>
-            <a:ext cx="8221770" cy="3960440"/>
+            <a:off x="467545" y="1844824"/>
+            <a:ext cx="7776863" cy="3816424"/>
           </a:xfrm>
           <a:prstGeom prst="rect">
             <a:avLst/>
@@ -7049,7 +7598,7 @@
                 <a:latin typeface="Times New Roman" pitchFamily="18" charset="0"/>
                 <a:cs typeface="Times New Roman" pitchFamily="18" charset="0"/>
               </a:rPr>
-              <a:t>Segundo passo:</a:t>
+              <a:t>Terceiro passo:</a:t>
             </a:r>
             <a:endParaRPr lang="pt-BR" sz="2800" dirty="0">
               <a:latin typeface="Times New Roman" pitchFamily="18" charset="0"/>
@@ -7057,24 +7606,13 @@
             </a:endParaRPr>
           </a:p>
           <a:p>
-            <a:pPr algn="just">
-              <a:spcBef>
-                <a:spcPts val="0"/>
-              </a:spcBef>
-            </a:pPr>
-            <a:r>
-              <a:rPr lang="pt-BR" sz="2800" b="0" dirty="0" smtClean="0">
-                <a:latin typeface="Times New Roman" pitchFamily="18" charset="0"/>
-                <a:cs typeface="Times New Roman" pitchFamily="18" charset="0"/>
-              </a:rPr>
-              <a:t>Importar </a:t>
-            </a:r>
+            <a:pPr algn="just"/>
             <a:r>
               <a:rPr lang="pt-BR" sz="2800" b="0" dirty="0">
                 <a:latin typeface="Times New Roman" pitchFamily="18" charset="0"/>
                 <a:cs typeface="Times New Roman" pitchFamily="18" charset="0"/>
               </a:rPr>
-              <a:t>as dependências do </a:t>
+              <a:t>Para nossa aplicação reconhecer os estilos do </a:t>
             </a:r>
             <a:r>
               <a:rPr lang="pt-BR" sz="2800" b="0" dirty="0" err="1">
@@ -7088,154 +7626,49 @@
                 <a:latin typeface="Times New Roman" pitchFamily="18" charset="0"/>
                 <a:cs typeface="Times New Roman" pitchFamily="18" charset="0"/>
               </a:rPr>
-              <a:t> no </a:t>
+              <a:t>, devemos adicionar os seguintes </a:t>
             </a:r>
             <a:r>
               <a:rPr lang="pt-BR" sz="2800" b="0" dirty="0" err="1">
                 <a:latin typeface="Times New Roman" pitchFamily="18" charset="0"/>
                 <a:cs typeface="Times New Roman" pitchFamily="18" charset="0"/>
               </a:rPr>
-              <a:t>package</a:t>
+              <a:t>CSSs</a:t>
             </a:r>
             <a:r>
               <a:rPr lang="pt-BR" sz="2800" b="0" dirty="0">
                 <a:latin typeface="Times New Roman" pitchFamily="18" charset="0"/>
                 <a:cs typeface="Times New Roman" pitchFamily="18" charset="0"/>
               </a:rPr>
-              <a:t> </a:t>
+              <a:t> dentro de </a:t>
             </a:r>
             <a:r>
               <a:rPr lang="pt-BR" sz="2800" b="0" dirty="0" err="1">
                 <a:latin typeface="Times New Roman" pitchFamily="18" charset="0"/>
                 <a:cs typeface="Times New Roman" pitchFamily="18" charset="0"/>
               </a:rPr>
-              <a:t>json</a:t>
+              <a:t>Styles</a:t>
             </a:r>
             <a:r>
               <a:rPr lang="pt-BR" sz="2800" b="0" dirty="0">
                 <a:latin typeface="Times New Roman" pitchFamily="18" charset="0"/>
                 <a:cs typeface="Times New Roman" pitchFamily="18" charset="0"/>
               </a:rPr>
-              <a:t> e declarar nos </a:t>
+              <a:t> do arquivo </a:t>
             </a:r>
             <a:r>
               <a:rPr lang="pt-BR" sz="2800" b="0" dirty="0" err="1">
                 <a:latin typeface="Times New Roman" pitchFamily="18" charset="0"/>
                 <a:cs typeface="Times New Roman" pitchFamily="18" charset="0"/>
               </a:rPr>
-              <a:t>assets</a:t>
+              <a:t>agular.json</a:t>
             </a:r>
             <a:r>
               <a:rPr lang="pt-BR" sz="2800" b="0" dirty="0">
                 <a:latin typeface="Times New Roman" pitchFamily="18" charset="0"/>
                 <a:cs typeface="Times New Roman" pitchFamily="18" charset="0"/>
               </a:rPr>
-              <a:t> os </a:t>
-            </a:r>
-            <a:r>
-              <a:rPr lang="pt-BR" sz="2800" b="0" dirty="0" err="1">
-                <a:latin typeface="Times New Roman" pitchFamily="18" charset="0"/>
-                <a:cs typeface="Times New Roman" pitchFamily="18" charset="0"/>
-              </a:rPr>
-              <a:t>styles</a:t>
-            </a:r>
-            <a:r>
-              <a:rPr lang="pt-BR" sz="2800" b="0" dirty="0">
-                <a:latin typeface="Times New Roman" pitchFamily="18" charset="0"/>
-                <a:cs typeface="Times New Roman" pitchFamily="18" charset="0"/>
-              </a:rPr>
-              <a:t> do </a:t>
-            </a:r>
-            <a:r>
-              <a:rPr lang="pt-BR" sz="2800" b="0" dirty="0" err="1" smtClean="0">
-                <a:latin typeface="Times New Roman" pitchFamily="18" charset="0"/>
-                <a:cs typeface="Times New Roman" pitchFamily="18" charset="0"/>
-              </a:rPr>
-              <a:t>PrimeNG</a:t>
-            </a:r>
-            <a:r>
-              <a:rPr lang="pt-BR" sz="2800" b="0" dirty="0" smtClean="0">
-                <a:latin typeface="Times New Roman" pitchFamily="18" charset="0"/>
-                <a:cs typeface="Times New Roman" pitchFamily="18" charset="0"/>
-              </a:rPr>
-              <a:t>. </a:t>
-            </a:r>
-          </a:p>
-          <a:p>
-            <a:pPr algn="just">
-              <a:spcBef>
-                <a:spcPts val="0"/>
-              </a:spcBef>
-            </a:pPr>
-            <a:r>
-              <a:rPr lang="pt-BR" sz="2800" b="0" dirty="0" smtClean="0">
-                <a:latin typeface="Times New Roman" pitchFamily="18" charset="0"/>
-                <a:cs typeface="Times New Roman" pitchFamily="18" charset="0"/>
-              </a:rPr>
-              <a:t>Se </a:t>
-            </a:r>
-            <a:r>
-              <a:rPr lang="pt-BR" sz="2800" b="0" dirty="0">
-                <a:latin typeface="Times New Roman" pitchFamily="18" charset="0"/>
-                <a:cs typeface="Times New Roman" pitchFamily="18" charset="0"/>
-              </a:rPr>
-              <a:t>caso em nosso </a:t>
-            </a:r>
-            <a:r>
-              <a:rPr lang="pt-BR" sz="2800" b="0" dirty="0" err="1">
-                <a:latin typeface="Times New Roman" pitchFamily="18" charset="0"/>
-                <a:cs typeface="Times New Roman" pitchFamily="18" charset="0"/>
-              </a:rPr>
-              <a:t>package.json</a:t>
-            </a:r>
-            <a:r>
-              <a:rPr lang="pt-BR" sz="2800" b="0" dirty="0">
-                <a:latin typeface="Times New Roman" pitchFamily="18" charset="0"/>
-                <a:cs typeface="Times New Roman" pitchFamily="18" charset="0"/>
-              </a:rPr>
-              <a:t> não ter sido gravadas as declarações das dependências do </a:t>
-            </a:r>
-            <a:r>
-              <a:rPr lang="pt-BR" sz="2800" b="0" dirty="0" err="1">
-                <a:latin typeface="Times New Roman" pitchFamily="18" charset="0"/>
-                <a:cs typeface="Times New Roman" pitchFamily="18" charset="0"/>
-              </a:rPr>
-              <a:t>PrimeNG</a:t>
-            </a:r>
-            <a:r>
-              <a:rPr lang="pt-BR" sz="2800" b="0" dirty="0">
-                <a:latin typeface="Times New Roman" pitchFamily="18" charset="0"/>
-                <a:cs typeface="Times New Roman" pitchFamily="18" charset="0"/>
-              </a:rPr>
-              <a:t>, devemos </a:t>
-            </a:r>
-            <a:r>
-              <a:rPr lang="pt-BR" sz="2800" b="0" dirty="0" smtClean="0">
-                <a:latin typeface="Times New Roman" pitchFamily="18" charset="0"/>
-                <a:cs typeface="Times New Roman" pitchFamily="18" charset="0"/>
-              </a:rPr>
-              <a:t>adicioná-las </a:t>
-            </a:r>
-            <a:r>
-              <a:rPr lang="pt-BR" sz="2800" b="0" dirty="0">
-                <a:latin typeface="Times New Roman" pitchFamily="18" charset="0"/>
-                <a:cs typeface="Times New Roman" pitchFamily="18" charset="0"/>
-              </a:rPr>
-              <a:t>dentro de </a:t>
-            </a:r>
-            <a:r>
-              <a:rPr lang="pt-BR" sz="2800" b="0" dirty="0" err="1">
-                <a:latin typeface="Times New Roman" pitchFamily="18" charset="0"/>
-                <a:cs typeface="Times New Roman" pitchFamily="18" charset="0"/>
-              </a:rPr>
-              <a:t>dependencies</a:t>
-            </a:r>
-            <a:r>
-              <a:rPr lang="pt-BR" sz="2800" b="0" dirty="0">
-                <a:latin typeface="Times New Roman" pitchFamily="18" charset="0"/>
-                <a:cs typeface="Times New Roman" pitchFamily="18" charset="0"/>
-              </a:rPr>
-              <a:t>:</a:t>
+              <a:t>.</a:t>
             </a:r>
           </a:p>
           <a:p>
@@ -7248,7 +7681,7 @@
       </p:sp>
       <p:pic>
         <p:nvPicPr>
-          <p:cNvPr id="1026" name="Picture 2"/>
+          <p:cNvPr id="2050" name="Picture 2"/>
           <p:cNvPicPr>
             <a:picLocks noChangeAspect="1" noChangeArrowheads="1"/>
           </p:cNvPicPr>
@@ -7262,13 +7695,13 @@
               </a:ext>
             </a:extLst>
           </a:blip>
-          <a:srcRect l="22745" t="48091" r="10532" b="15776"/>
+          <a:srcRect l="32745" t="53646" r="17200" b="26133"/>
           <a:stretch/>
         </p:blipFill>
         <p:spPr bwMode="auto">
           <a:xfrm>
-            <a:off x="1115616" y="4564977"/>
-            <a:ext cx="6624736" cy="2025945"/>
+            <a:off x="1063904" y="4221088"/>
+            <a:ext cx="6944183" cy="1584176"/>
           </a:xfrm>
           <a:prstGeom prst="rect">
             <a:avLst/>
@@ -7311,7 +7744,7 @@
     </p:spTree>
     <p:extLst>
       <p:ext uri="{BB962C8B-B14F-4D97-AF65-F5344CB8AC3E}">
-        <p14:creationId xmlns:p14="http://schemas.microsoft.com/office/powerpoint/2010/main" val="90333842"/>
+        <p14:creationId xmlns:p14="http://schemas.microsoft.com/office/powerpoint/2010/main" val="708196595"/>
       </p:ext>
     </p:extLst>
   </p:cSld>
@@ -7499,8 +7932,8 @@
         </p:nvSpPr>
         <p:spPr>
           <a:xfrm>
-            <a:off x="467545" y="1844824"/>
-            <a:ext cx="7776863" cy="3816424"/>
+            <a:off x="539552" y="1822748"/>
+            <a:ext cx="7632848" cy="4392488"/>
           </a:xfrm>
           <a:prstGeom prst="rect">
             <a:avLst/>
@@ -7680,7 +8113,7 @@
                 <a:latin typeface="Times New Roman" pitchFamily="18" charset="0"/>
                 <a:cs typeface="Times New Roman" pitchFamily="18" charset="0"/>
               </a:rPr>
-              <a:t>Terceiro passo:</a:t>
+              <a:t>Quarto passo:</a:t>
             </a:r>
             <a:endParaRPr lang="pt-BR" sz="2800" dirty="0">
               <a:latin typeface="Times New Roman" pitchFamily="18" charset="0"/>
@@ -7690,67 +8123,98 @@
           <a:p>
             <a:pPr algn="just"/>
             <a:r>
+              <a:rPr lang="pt-BR" sz="2800" b="0" dirty="0" smtClean="0">
+                <a:latin typeface="Times New Roman" pitchFamily="18" charset="0"/>
+                <a:cs typeface="Times New Roman" pitchFamily="18" charset="0"/>
+              </a:rPr>
+              <a:t>A </a:t>
+            </a:r>
+            <a:r>
               <a:rPr lang="pt-BR" sz="2800" b="0" dirty="0">
                 <a:latin typeface="Times New Roman" pitchFamily="18" charset="0"/>
                 <a:cs typeface="Times New Roman" pitchFamily="18" charset="0"/>
               </a:rPr>
-              <a:t>Para nossa aplicação reconhecer os estilos do </a:t>
+              <a:t>dependência </a:t>
             </a:r>
             <a:r>
               <a:rPr lang="pt-BR" sz="2800" b="0" dirty="0" err="1">
                 <a:latin typeface="Times New Roman" pitchFamily="18" charset="0"/>
                 <a:cs typeface="Times New Roman" pitchFamily="18" charset="0"/>
               </a:rPr>
-              <a:t>PrimeNG</a:t>
+              <a:t>animations</a:t>
             </a:r>
             <a:r>
               <a:rPr lang="pt-BR" sz="2800" b="0" dirty="0">
                 <a:latin typeface="Times New Roman" pitchFamily="18" charset="0"/>
                 <a:cs typeface="Times New Roman" pitchFamily="18" charset="0"/>
               </a:rPr>
-              <a:t>, devemos adicionar os seguintes </a:t>
+              <a:t> é utilizada em diversos componentes do framework, logo ao realizar o download da biblioteca, o módulo </a:t>
+            </a:r>
+            <a:r>
+              <a:rPr lang="pt-BR" sz="2800" b="0" dirty="0" err="1" smtClean="0">
+                <a:latin typeface="Times New Roman" pitchFamily="18" charset="0"/>
+                <a:cs typeface="Times New Roman" pitchFamily="18" charset="0"/>
+              </a:rPr>
+              <a:t>BrowserAnimationsModule</a:t>
+            </a:r>
+            <a:r>
+              <a:rPr lang="pt-BR" sz="2800" b="0" dirty="0" smtClean="0">
+                <a:latin typeface="Times New Roman" pitchFamily="18" charset="0"/>
+                <a:cs typeface="Times New Roman" pitchFamily="18" charset="0"/>
+              </a:rPr>
+              <a:t> </a:t>
+            </a:r>
+            <a:r>
+              <a:rPr lang="pt-BR" sz="2800" b="0" dirty="0">
+                <a:latin typeface="Times New Roman" pitchFamily="18" charset="0"/>
+                <a:cs typeface="Times New Roman" pitchFamily="18" charset="0"/>
+              </a:rPr>
+              <a:t>do </a:t>
             </a:r>
             <a:r>
               <a:rPr lang="pt-BR" sz="2800" b="0" dirty="0" err="1">
                 <a:latin typeface="Times New Roman" pitchFamily="18" charset="0"/>
                 <a:cs typeface="Times New Roman" pitchFamily="18" charset="0"/>
               </a:rPr>
-              <a:t>CSSs</a:t>
+              <a:t>Animations</a:t>
             </a:r>
             <a:r>
               <a:rPr lang="pt-BR" sz="2800" b="0" dirty="0">
                 <a:latin typeface="Times New Roman" pitchFamily="18" charset="0"/>
                 <a:cs typeface="Times New Roman" pitchFamily="18" charset="0"/>
               </a:rPr>
-              <a:t> dentro de </a:t>
+              <a:t> deve ser importado em nossa aplicação.</a:t>
+            </a:r>
+          </a:p>
+          <a:p>
+            <a:pPr algn="just"/>
+            <a:r>
+              <a:rPr lang="pt-BR" sz="2800" b="0" dirty="0" smtClean="0">
+                <a:latin typeface="Times New Roman" pitchFamily="18" charset="0"/>
+                <a:cs typeface="Times New Roman" pitchFamily="18" charset="0"/>
+              </a:rPr>
+              <a:t>Assim </a:t>
+            </a:r>
+            <a:r>
+              <a:rPr lang="pt-BR" sz="2800" b="0" dirty="0">
+                <a:latin typeface="Times New Roman" pitchFamily="18" charset="0"/>
+                <a:cs typeface="Times New Roman" pitchFamily="18" charset="0"/>
+              </a:rPr>
+              <a:t>como no </a:t>
             </a:r>
             <a:r>
               <a:rPr lang="pt-BR" sz="2800" b="0" dirty="0" err="1">
                 <a:latin typeface="Times New Roman" pitchFamily="18" charset="0"/>
                 <a:cs typeface="Times New Roman" pitchFamily="18" charset="0"/>
               </a:rPr>
-              <a:t>Styles</a:t>
+              <a:t>animation</a:t>
             </a:r>
             <a:r>
               <a:rPr lang="pt-BR" sz="2800" b="0" dirty="0">
                 <a:latin typeface="Times New Roman" pitchFamily="18" charset="0"/>
                 <a:cs typeface="Times New Roman" pitchFamily="18" charset="0"/>
               </a:rPr>
-              <a:t> do arquivo </a:t>
-            </a:r>
-            <a:r>
-              <a:rPr lang="pt-BR" sz="2800" b="0" dirty="0" err="1">
-                <a:latin typeface="Times New Roman" pitchFamily="18" charset="0"/>
-                <a:cs typeface="Times New Roman" pitchFamily="18" charset="0"/>
-              </a:rPr>
-              <a:t>agular.json</a:t>
-            </a:r>
-            <a:r>
-              <a:rPr lang="pt-BR" sz="2800" b="0" dirty="0">
-                <a:latin typeface="Times New Roman" pitchFamily="18" charset="0"/>
-                <a:cs typeface="Times New Roman" pitchFamily="18" charset="0"/>
-              </a:rPr>
-              <a:t>.</a:t>
+              <a:t>, podemos importar mais alguns módulos que utilizaremos durante o desenvolvimento.</a:t>
             </a:r>
           </a:p>
           <a:p>
@@ -7761,72 +8225,10 @@
           </a:p>
         </p:txBody>
       </p:sp>
-      <p:pic>
-        <p:nvPicPr>
-          <p:cNvPr id="2050" name="Picture 2"/>
-          <p:cNvPicPr>
-            <a:picLocks noChangeAspect="1" noChangeArrowheads="1"/>
-          </p:cNvPicPr>
-          <p:nvPr/>
-        </p:nvPicPr>
-        <p:blipFill rotWithShape="1">
-          <a:blip r:embed="rId3">
-            <a:extLst>
-              <a:ext uri="{28A0092B-C50C-407E-A947-70E740481C1C}">
-                <a14:useLocalDpi xmlns:a14="http://schemas.microsoft.com/office/drawing/2010/main" val="0"/>
-              </a:ext>
-            </a:extLst>
-          </a:blip>
-          <a:srcRect l="32745" t="53646" r="17200" b="26133"/>
-          <a:stretch/>
-        </p:blipFill>
-        <p:spPr bwMode="auto">
-          <a:xfrm>
-            <a:off x="1063904" y="4221088"/>
-            <a:ext cx="6944183" cy="1584176"/>
-          </a:xfrm>
-          <a:prstGeom prst="rect">
-            <a:avLst/>
-          </a:prstGeom>
-          <a:noFill/>
-          <a:ln>
-            <a:noFill/>
-          </a:ln>
-          <a:effectLst/>
-          <a:extLst>
-            <a:ext uri="{909E8E84-426E-40DD-AFC4-6F175D3DCCD1}">
-              <a14:hiddenFill xmlns:a14="http://schemas.microsoft.com/office/drawing/2010/main">
-                <a:solidFill>
-                  <a:schemeClr val="accent1"/>
-                </a:solidFill>
-              </a14:hiddenFill>
-            </a:ext>
-            <a:ext uri="{91240B29-F687-4F45-9708-019B960494DF}">
-              <a14:hiddenLine xmlns:a14="http://schemas.microsoft.com/office/drawing/2010/main" w="9525">
-                <a:solidFill>
-                  <a:schemeClr val="tx1"/>
-                </a:solidFill>
-                <a:miter lim="800000"/>
-                <a:headEnd/>
-                <a:tailEnd/>
-              </a14:hiddenLine>
-            </a:ext>
-            <a:ext uri="{AF507438-7753-43E0-B8FC-AC1667EBCBE1}">
-              <a14:hiddenEffects xmlns:a14="http://schemas.microsoft.com/office/drawing/2010/main">
-                <a:effectLst>
-                  <a:outerShdw dist="35921" dir="2700000" algn="ctr" rotWithShape="0">
-                    <a:schemeClr val="bg2"/>
-                  </a:outerShdw>
-                </a:effectLst>
-              </a14:hiddenEffects>
-            </a:ext>
-          </a:extLst>
-        </p:spPr>
-      </p:pic>
     </p:spTree>
     <p:extLst>
       <p:ext uri="{BB962C8B-B14F-4D97-AF65-F5344CB8AC3E}">
-        <p14:creationId xmlns:p14="http://schemas.microsoft.com/office/powerpoint/2010/main" val="708196595"/>
+        <p14:creationId xmlns:p14="http://schemas.microsoft.com/office/powerpoint/2010/main" val="105453064"/>
       </p:ext>
     </p:extLst>
   </p:cSld>
@@ -7860,6 +8262,72 @@
           <a:chExt cx="0" cy="0"/>
         </a:xfrm>
       </p:grpSpPr>
+      <p:pic>
+        <p:nvPicPr>
+          <p:cNvPr id="2" name="Imagem 1"/>
+          <p:cNvPicPr/>
+          <p:nvPr/>
+        </p:nvPicPr>
+        <p:blipFill rotWithShape="1">
+          <a:blip r:embed="rId2"/>
+          <a:srcRect l="4587" t="6954" r="43885" b="3311"/>
+          <a:stretch/>
+        </p:blipFill>
+        <p:spPr bwMode="auto">
+          <a:xfrm>
+            <a:off x="546678" y="144016"/>
+            <a:ext cx="7913754" cy="6525344"/>
+          </a:xfrm>
+          <a:prstGeom prst="rect">
+            <a:avLst/>
+          </a:prstGeom>
+          <a:ln>
+            <a:noFill/>
+          </a:ln>
+          <a:extLst>
+            <a:ext uri="{53640926-AAD7-44D8-BBD7-CCE9431645EC}">
+              <a14:shadowObscured xmlns:a14="http://schemas.microsoft.com/office/drawing/2010/main"/>
+            </a:ext>
+          </a:extLst>
+        </p:spPr>
+      </p:pic>
+    </p:spTree>
+    <p:extLst>
+      <p:ext uri="{BB962C8B-B14F-4D97-AF65-F5344CB8AC3E}">
+        <p14:creationId xmlns:p14="http://schemas.microsoft.com/office/powerpoint/2010/main" val="3633480535"/>
+      </p:ext>
+    </p:extLst>
+  </p:cSld>
+  <p:clrMapOvr>
+    <a:masterClrMapping/>
+  </p:clrMapOvr>
+  <p:timing>
+    <p:tnLst>
+      <p:par>
+        <p:cTn id="1" dur="indefinite" restart="never" nodeType="tmRoot"/>
+      </p:par>
+    </p:tnLst>
+  </p:timing>
+</p:sld>
+</file>
+
+<file path=ppt/slides/slide23.xml><?xml version="1.0" encoding="utf-8"?>
+<p:sld xmlns:a="http://schemas.openxmlformats.org/drawingml/2006/main" xmlns:r="http://schemas.openxmlformats.org/officeDocument/2006/relationships" xmlns:p="http://schemas.openxmlformats.org/presentationml/2006/main">
+  <p:cSld>
+    <p:spTree>
+      <p:nvGrpSpPr>
+        <p:cNvPr id="1" name=""/>
+        <p:cNvGrpSpPr/>
+        <p:nvPr/>
+      </p:nvGrpSpPr>
+      <p:grpSpPr>
+        <a:xfrm>
+          <a:off x="0" y="0"/>
+          <a:ext cx="0" cy="0"/>
+          <a:chOff x="0" y="0"/>
+          <a:chExt cx="0" cy="0"/>
+        </a:xfrm>
+      </p:grpSpPr>
       <p:sp>
         <p:nvSpPr>
           <p:cNvPr id="2" name="Título 1"/>
@@ -7918,7 +8386,7 @@
         <p:spPr>
           <a:xfrm>
             <a:off x="395536" y="1844824"/>
-            <a:ext cx="8077755" cy="3960440"/>
+            <a:ext cx="8208911" cy="3960440"/>
           </a:xfrm>
         </p:spPr>
         <p:txBody>
@@ -8014,8 +8482,8 @@
         </p:nvSpPr>
         <p:spPr>
           <a:xfrm>
-            <a:off x="539552" y="1822748"/>
-            <a:ext cx="7632848" cy="4392488"/>
+            <a:off x="323528" y="1844824"/>
+            <a:ext cx="8149763" cy="3816424"/>
           </a:xfrm>
           <a:prstGeom prst="rect">
             <a:avLst/>
@@ -8205,102 +8673,65 @@
           <a:p>
             <a:pPr algn="just"/>
             <a:r>
+              <a:rPr lang="pt-BR" sz="2800" b="0" dirty="0">
+                <a:latin typeface="Times New Roman" pitchFamily="18" charset="0"/>
+                <a:cs typeface="Times New Roman" pitchFamily="18" charset="0"/>
+              </a:rPr>
+              <a:t>É válido lembrar que os itens que são importados como módulos, </a:t>
+            </a:r>
+            <a:r>
+              <a:rPr lang="pt-BR" sz="2800" b="0" dirty="0" err="1">
+                <a:latin typeface="Times New Roman" pitchFamily="18" charset="0"/>
+                <a:cs typeface="Times New Roman" pitchFamily="18" charset="0"/>
+              </a:rPr>
+              <a:t>pipes</a:t>
+            </a:r>
+            <a:r>
+              <a:rPr lang="pt-BR" sz="2800" b="0" dirty="0">
+                <a:latin typeface="Times New Roman" pitchFamily="18" charset="0"/>
+                <a:cs typeface="Times New Roman" pitchFamily="18" charset="0"/>
+              </a:rPr>
+              <a:t>, </a:t>
+            </a:r>
+            <a:r>
+              <a:rPr lang="pt-BR" sz="2800" b="0" dirty="0" err="1">
+                <a:latin typeface="Times New Roman" pitchFamily="18" charset="0"/>
+                <a:cs typeface="Times New Roman" pitchFamily="18" charset="0"/>
+              </a:rPr>
+              <a:t>components</a:t>
+            </a:r>
+            <a:r>
+              <a:rPr lang="pt-BR" sz="2800" b="0" dirty="0">
+                <a:latin typeface="Times New Roman" pitchFamily="18" charset="0"/>
+                <a:cs typeface="Times New Roman" pitchFamily="18" charset="0"/>
+              </a:rPr>
+              <a:t>, </a:t>
+            </a:r>
+            <a:r>
+              <a:rPr lang="pt-BR" sz="2800" b="0" dirty="0" err="1">
+                <a:latin typeface="Times New Roman" pitchFamily="18" charset="0"/>
+                <a:cs typeface="Times New Roman" pitchFamily="18" charset="0"/>
+              </a:rPr>
+              <a:t>etc</a:t>
+            </a:r>
+            <a:r>
+              <a:rPr lang="pt-BR" sz="2800" b="0" dirty="0">
+                <a:latin typeface="Times New Roman" pitchFamily="18" charset="0"/>
+                <a:cs typeface="Times New Roman" pitchFamily="18" charset="0"/>
+              </a:rPr>
+              <a:t>, devem ser exportados se forem utilizados de forma </a:t>
+            </a:r>
+            <a:r>
               <a:rPr lang="pt-BR" sz="2800" b="0" dirty="0" smtClean="0">
                 <a:latin typeface="Times New Roman" pitchFamily="18" charset="0"/>
                 <a:cs typeface="Times New Roman" pitchFamily="18" charset="0"/>
               </a:rPr>
-              <a:t>A </a:t>
-            </a:r>
-            <a:r>
-              <a:rPr lang="pt-BR" sz="2800" b="0" dirty="0">
-                <a:latin typeface="Times New Roman" pitchFamily="18" charset="0"/>
-                <a:cs typeface="Times New Roman" pitchFamily="18" charset="0"/>
-              </a:rPr>
-              <a:t>dependência </a:t>
-            </a:r>
-            <a:r>
-              <a:rPr lang="pt-BR" sz="2800" b="0" dirty="0" err="1">
-                <a:latin typeface="Times New Roman" pitchFamily="18" charset="0"/>
-                <a:cs typeface="Times New Roman" pitchFamily="18" charset="0"/>
-              </a:rPr>
-              <a:t>animations</a:t>
-            </a:r>
-            <a:r>
-              <a:rPr lang="pt-BR" sz="2800" b="0" dirty="0">
-                <a:latin typeface="Times New Roman" pitchFamily="18" charset="0"/>
-                <a:cs typeface="Times New Roman" pitchFamily="18" charset="0"/>
-              </a:rPr>
-              <a:t> é utilizada em diversos componentes do framework, logo ao realizar o download da biblioteca, o módulo </a:t>
-            </a:r>
-            <a:r>
-              <a:rPr lang="pt-BR" sz="2800" b="0" dirty="0" err="1" smtClean="0">
-                <a:latin typeface="Times New Roman" pitchFamily="18" charset="0"/>
-                <a:cs typeface="Times New Roman" pitchFamily="18" charset="0"/>
-              </a:rPr>
-              <a:t>BrowserAnimationsModule</a:t>
-            </a:r>
-            <a:r>
-              <a:rPr lang="pt-BR" sz="2800" b="0" dirty="0" smtClean="0">
-                <a:latin typeface="Times New Roman" pitchFamily="18" charset="0"/>
-                <a:cs typeface="Times New Roman" pitchFamily="18" charset="0"/>
-              </a:rPr>
-              <a:t> </a:t>
-            </a:r>
-            <a:r>
-              <a:rPr lang="pt-BR" sz="2800" b="0" dirty="0">
-                <a:latin typeface="Times New Roman" pitchFamily="18" charset="0"/>
-                <a:cs typeface="Times New Roman" pitchFamily="18" charset="0"/>
-              </a:rPr>
-              <a:t>do </a:t>
-            </a:r>
-            <a:r>
-              <a:rPr lang="pt-BR" sz="2800" b="0" dirty="0" err="1">
-                <a:latin typeface="Times New Roman" pitchFamily="18" charset="0"/>
-                <a:cs typeface="Times New Roman" pitchFamily="18" charset="0"/>
-              </a:rPr>
-              <a:t>Animations</a:t>
-            </a:r>
-            <a:r>
-              <a:rPr lang="pt-BR" sz="2800" b="0" dirty="0">
-                <a:latin typeface="Times New Roman" pitchFamily="18" charset="0"/>
-                <a:cs typeface="Times New Roman" pitchFamily="18" charset="0"/>
-              </a:rPr>
-              <a:t> deve ser importado em nossa aplicação.</a:t>
-            </a:r>
-          </a:p>
-          <a:p>
-            <a:pPr algn="just"/>
-            <a:r>
-              <a:rPr lang="pt-BR" sz="2800" b="0" dirty="0" smtClean="0">
-                <a:latin typeface="Times New Roman" pitchFamily="18" charset="0"/>
-                <a:cs typeface="Times New Roman" pitchFamily="18" charset="0"/>
-              </a:rPr>
-              <a:t>Assim </a:t>
-            </a:r>
-            <a:r>
-              <a:rPr lang="pt-BR" sz="2800" b="0" dirty="0">
-                <a:latin typeface="Times New Roman" pitchFamily="18" charset="0"/>
-                <a:cs typeface="Times New Roman" pitchFamily="18" charset="0"/>
-              </a:rPr>
-              <a:t>como no </a:t>
-            </a:r>
-            <a:r>
-              <a:rPr lang="pt-BR" sz="2800" b="0" dirty="0" err="1">
-                <a:latin typeface="Times New Roman" pitchFamily="18" charset="0"/>
-                <a:cs typeface="Times New Roman" pitchFamily="18" charset="0"/>
-              </a:rPr>
-              <a:t>animation</a:t>
-            </a:r>
-            <a:r>
-              <a:rPr lang="pt-BR" sz="2800" b="0" dirty="0">
-                <a:latin typeface="Times New Roman" pitchFamily="18" charset="0"/>
-                <a:cs typeface="Times New Roman" pitchFamily="18" charset="0"/>
-              </a:rPr>
-              <a:t>, podemos importar mais alguns módulos que utilizaremos durante o desenvolvimento.</a:t>
-            </a:r>
-          </a:p>
-          <a:p>
-            <a:endParaRPr lang="pt-BR" sz="2800" dirty="0" smtClean="0"/>
+              <a:t>compartilhada.</a:t>
+            </a:r>
+            <a:endParaRPr lang="pt-BR" sz="2800" b="0" dirty="0">
+              <a:latin typeface="Times New Roman" pitchFamily="18" charset="0"/>
+              <a:cs typeface="Times New Roman" pitchFamily="18" charset="0"/>
+            </a:endParaRPr>
           </a:p>
           <a:p>
             <a:endParaRPr lang="pt-BR" sz="2600" dirty="0"/>
@@ -8310,73 +8741,7 @@
     </p:spTree>
     <p:extLst>
       <p:ext uri="{BB962C8B-B14F-4D97-AF65-F5344CB8AC3E}">
-        <p14:creationId xmlns:p14="http://schemas.microsoft.com/office/powerpoint/2010/main" val="105453064"/>
-      </p:ext>
-    </p:extLst>
-  </p:cSld>
-  <p:clrMapOvr>
-    <a:masterClrMapping/>
-  </p:clrMapOvr>
-  <p:timing>
-    <p:tnLst>
-      <p:par>
-        <p:cTn id="1" dur="indefinite" restart="never" nodeType="tmRoot"/>
-      </p:par>
-    </p:tnLst>
-  </p:timing>
-</p:sld>
-</file>
-
-<file path=ppt/slides/slide23.xml><?xml version="1.0" encoding="utf-8"?>
-<p:sld xmlns:a="http://schemas.openxmlformats.org/drawingml/2006/main" xmlns:r="http://schemas.openxmlformats.org/officeDocument/2006/relationships" xmlns:p="http://schemas.openxmlformats.org/presentationml/2006/main">
-  <p:cSld>
-    <p:spTree>
-      <p:nvGrpSpPr>
-        <p:cNvPr id="1" name=""/>
-        <p:cNvGrpSpPr/>
-        <p:nvPr/>
-      </p:nvGrpSpPr>
-      <p:grpSpPr>
-        <a:xfrm>
-          <a:off x="0" y="0"/>
-          <a:ext cx="0" cy="0"/>
-          <a:chOff x="0" y="0"/>
-          <a:chExt cx="0" cy="0"/>
-        </a:xfrm>
-      </p:grpSpPr>
-      <p:pic>
-        <p:nvPicPr>
-          <p:cNvPr id="2" name="Imagem 1"/>
-          <p:cNvPicPr/>
-          <p:nvPr/>
-        </p:nvPicPr>
-        <p:blipFill rotWithShape="1">
-          <a:blip r:embed="rId2"/>
-          <a:srcRect l="4587" t="6954" r="43885" b="3311"/>
-          <a:stretch/>
-        </p:blipFill>
-        <p:spPr bwMode="auto">
-          <a:xfrm>
-            <a:off x="683568" y="692696"/>
-            <a:ext cx="7776864" cy="5544616"/>
-          </a:xfrm>
-          <a:prstGeom prst="rect">
-            <a:avLst/>
-          </a:prstGeom>
-          <a:ln>
-            <a:noFill/>
-          </a:ln>
-          <a:extLst>
-            <a:ext uri="{53640926-AAD7-44D8-BBD7-CCE9431645EC}">
-              <a14:shadowObscured xmlns:a14="http://schemas.microsoft.com/office/drawing/2010/main"/>
-            </a:ext>
-          </a:extLst>
-        </p:spPr>
-      </p:pic>
-    </p:spTree>
-    <p:extLst>
-      <p:ext uri="{BB962C8B-B14F-4D97-AF65-F5344CB8AC3E}">
-        <p14:creationId xmlns:p14="http://schemas.microsoft.com/office/powerpoint/2010/main" val="3633480535"/>
+        <p14:creationId xmlns:p14="http://schemas.microsoft.com/office/powerpoint/2010/main" val="575733719"/>
       </p:ext>
     </p:extLst>
   </p:cSld>
@@ -8422,78 +8787,96 @@
         </p:nvSpPr>
         <p:spPr>
           <a:xfrm>
-            <a:off x="251521" y="323403"/>
-            <a:ext cx="6480720" cy="903630"/>
+            <a:off x="322059" y="3140968"/>
+            <a:ext cx="8363272" cy="2844234"/>
           </a:xfrm>
         </p:spPr>
         <p:txBody>
           <a:bodyPr>
-            <a:noAutofit/>
+            <a:normAutofit/>
           </a:bodyPr>
           <a:lstStyle/>
           <a:p>
             <a:pPr algn="ctr"/>
             <a:r>
-              <a:rPr lang="pt-BR" sz="2800" b="1" dirty="0"/>
-              <a:t>IMPORTANDO O </a:t>
-            </a:r>
-            <a:r>
-              <a:rPr lang="pt-BR" sz="2800" b="1" dirty="0" smtClean="0"/>
-              <a:t>PRIMENG</a:t>
+              <a:rPr lang="pt-BR" sz="4800" dirty="0" err="1" smtClean="0">
+                <a:solidFill>
+                  <a:schemeClr val="tx1"/>
+                </a:solidFill>
+                <a:latin typeface="Times New Roman" pitchFamily="18" charset="0"/>
+                <a:cs typeface="Times New Roman" pitchFamily="18" charset="0"/>
+              </a:rPr>
+              <a:t>Login</a:t>
+            </a:r>
+            <a:r>
+              <a:rPr lang="pt-BR" sz="4800" dirty="0" smtClean="0">
+                <a:solidFill>
+                  <a:schemeClr val="tx1"/>
+                </a:solidFill>
+                <a:latin typeface="Times New Roman" pitchFamily="18" charset="0"/>
+                <a:cs typeface="Times New Roman" pitchFamily="18" charset="0"/>
+              </a:rPr>
+              <a:t> e Menu dinâmico</a:t>
+            </a:r>
+            <a:r>
+              <a:rPr lang="pt-BR" sz="4800" b="1" dirty="0"/>
+              <a:t/>
             </a:r>
             <a:br>
-              <a:rPr lang="pt-BR" sz="2800" b="1" dirty="0" smtClean="0"/>
+              <a:rPr lang="pt-BR" sz="4800" b="1" dirty="0"/>
             </a:br>
             <a:r>
-              <a:rPr lang="pt-BR" sz="2800" b="1" dirty="0" smtClean="0"/>
-              <a:t> </a:t>
-            </a:r>
-            <a:r>
-              <a:rPr lang="pt-BR" sz="2800" b="1" dirty="0"/>
-              <a:t>EM NOSSO PROJETO</a:t>
-            </a:r>
-          </a:p>
-        </p:txBody>
-      </p:sp>
-      <p:sp>
-        <p:nvSpPr>
-          <p:cNvPr id="3" name="Espaço Reservado para Conteúdo 2"/>
-          <p:cNvSpPr>
-            <a:spLocks noGrp="1"/>
-          </p:cNvSpPr>
-          <p:nvPr>
-            <p:ph idx="1"/>
-          </p:nvPr>
-        </p:nvSpPr>
-        <p:spPr>
-          <a:xfrm>
-            <a:off x="395536" y="1844824"/>
-            <a:ext cx="8208911" cy="3960440"/>
-          </a:xfrm>
-        </p:spPr>
-        <p:txBody>
-          <a:bodyPr>
-            <a:noAutofit/>
-          </a:bodyPr>
-          <a:lstStyle/>
-          <a:p>
-            <a:endParaRPr lang="pt-BR" sz="2600" dirty="0"/>
-          </a:p>
-          <a:p>
-            <a:endParaRPr lang="pt-BR" sz="2600" dirty="0"/>
+              <a:rPr lang="pt-BR" sz="2400" b="1" dirty="0" smtClean="0">
+                <a:solidFill>
+                  <a:schemeClr val="tx1"/>
+                </a:solidFill>
+                <a:latin typeface="Times New Roman" pitchFamily="18" charset="0"/>
+                <a:cs typeface="Times New Roman" pitchFamily="18" charset="0"/>
+              </a:rPr>
+              <a:t/>
+            </a:r>
+            <a:br>
+              <a:rPr lang="pt-BR" sz="2400" b="1" dirty="0" smtClean="0">
+                <a:solidFill>
+                  <a:schemeClr val="tx1"/>
+                </a:solidFill>
+                <a:latin typeface="Times New Roman" pitchFamily="18" charset="0"/>
+                <a:cs typeface="Times New Roman" pitchFamily="18" charset="0"/>
+              </a:rPr>
+            </a:br>
+            <a:r>
+              <a:rPr lang="pt-BR" b="1" dirty="0">
+                <a:solidFill>
+                  <a:schemeClr val="tx1"/>
+                </a:solidFill>
+              </a:rPr>
+              <a:t/>
+            </a:r>
+            <a:br>
+              <a:rPr lang="pt-BR" b="1" dirty="0">
+                <a:solidFill>
+                  <a:schemeClr val="tx1"/>
+                </a:solidFill>
+              </a:rPr>
+            </a:br>
+            <a:endParaRPr lang="pt-BR" b="1" dirty="0">
+              <a:solidFill>
+                <a:schemeClr val="tx1"/>
+              </a:solidFill>
+            </a:endParaRPr>
           </a:p>
         </p:txBody>
       </p:sp>
       <p:cxnSp>
         <p:nvCxnSpPr>
-          <p:cNvPr id="5" name="Conector reto 4"/>
+          <p:cNvPr id="4" name="Conector reto 3"/>
           <p:cNvCxnSpPr/>
           <p:nvPr/>
         </p:nvCxnSpPr>
         <p:spPr>
           <a:xfrm>
-            <a:off x="251520" y="1340768"/>
-            <a:ext cx="6480720" cy="0"/>
+            <a:off x="719082" y="4581128"/>
+            <a:ext cx="7416824" cy="0"/>
           </a:xfrm>
           <a:prstGeom prst="line">
             <a:avLst/>
@@ -8517,14 +8900,45 @@
       </p:cxnSp>
       <p:pic>
         <p:nvPicPr>
-          <p:cNvPr id="6" name="Picture 7" descr="Angular-Logo-PNG-Image.png"/>
+          <p:cNvPr id="14" name="Imagem 13" descr="C:\Users\User\Desktop\Workshop\angular-project\Apresentação\Imagens\angular2.png"/>
+          <p:cNvPicPr/>
+          <p:nvPr/>
+        </p:nvPicPr>
+        <p:blipFill rotWithShape="1">
+          <a:blip r:embed="rId2">
+            <a:extLst>
+              <a:ext uri="{28A0092B-C50C-407E-A947-70E740481C1C}">
+                <a14:useLocalDpi xmlns:a14="http://schemas.microsoft.com/office/drawing/2010/main" val="0"/>
+              </a:ext>
+            </a:extLst>
+          </a:blip>
+          <a:srcRect t="54477" r="301"/>
+          <a:stretch/>
+        </p:blipFill>
+        <p:spPr bwMode="auto">
+          <a:xfrm>
+            <a:off x="-1956" y="2107"/>
+            <a:ext cx="9011302" cy="2778821"/>
+          </a:xfrm>
+          <a:prstGeom prst="rect">
+            <a:avLst/>
+          </a:prstGeom>
+          <a:noFill/>
+          <a:ln>
+            <a:noFill/>
+          </a:ln>
+        </p:spPr>
+      </p:pic>
+      <p:pic>
+        <p:nvPicPr>
+          <p:cNvPr id="15" name="Picture 7" descr="Angular-Logo-PNG-Image.png"/>
           <p:cNvPicPr>
             <a:picLocks noChangeAspect="1" noChangeArrowheads="1"/>
           </p:cNvPicPr>
           <p:nvPr/>
         </p:nvPicPr>
         <p:blipFill rotWithShape="1">
-          <a:blip r:embed="rId2" cstate="print">
+          <a:blip r:embed="rId3" cstate="print">
             <a:extLst>
               <a:ext uri="{28A0092B-C50C-407E-A947-70E740481C1C}">
                 <a14:useLocalDpi xmlns:a14="http://schemas.microsoft.com/office/drawing/2010/main" val="0"/>
@@ -8536,8 +8950,8 @@
         </p:blipFill>
         <p:spPr bwMode="auto">
           <a:xfrm>
-            <a:off x="7156265" y="160338"/>
-            <a:ext cx="1317026" cy="1433826"/>
+            <a:off x="3666679" y="387026"/>
+            <a:ext cx="1810641" cy="1971217"/>
           </a:xfrm>
           <a:prstGeom prst="rect">
             <a:avLst/>
@@ -8554,271 +8968,24 @@
           </a:extLst>
         </p:spPr>
       </p:pic>
-      <p:sp>
-        <p:nvSpPr>
-          <p:cNvPr id="7" name="Espaço Reservado para Conteúdo 2"/>
-          <p:cNvSpPr txBox="1">
-            <a:spLocks/>
-          </p:cNvSpPr>
-          <p:nvPr/>
-        </p:nvSpPr>
-        <p:spPr>
-          <a:xfrm>
-            <a:off x="323528" y="1844824"/>
-            <a:ext cx="8149763" cy="3816424"/>
-          </a:xfrm>
-          <a:prstGeom prst="rect">
-            <a:avLst/>
-          </a:prstGeom>
-        </p:spPr>
-        <p:txBody>
-          <a:bodyPr vert="horz" lIns="91440" tIns="45720" rIns="91440" bIns="45720" rtlCol="0">
-            <a:noAutofit/>
-          </a:bodyPr>
-          <a:lstStyle>
-            <a:lvl1pPr marL="0" indent="0" algn="l" defTabSz="914400" rtl="0" eaLnBrk="1" latinLnBrk="0" hangingPunct="1">
-              <a:spcBef>
-                <a:spcPct val="20000"/>
-              </a:spcBef>
-              <a:spcAft>
-                <a:spcPts val="600"/>
-              </a:spcAft>
-              <a:buFont typeface="Arial" pitchFamily="34" charset="0"/>
-              <a:buNone/>
-              <a:defRPr sz="2000" b="1" kern="1200">
-                <a:solidFill>
-                  <a:schemeClr val="tx1"/>
-                </a:solidFill>
-                <a:latin typeface="+mn-lt"/>
-                <a:ea typeface="+mn-ea"/>
-                <a:cs typeface="+mn-cs"/>
-              </a:defRPr>
-            </a:lvl1pPr>
-            <a:lvl2pPr marL="457200" indent="-182880" algn="l" defTabSz="914400" rtl="0" eaLnBrk="1" latinLnBrk="0" hangingPunct="1">
-              <a:spcBef>
-                <a:spcPct val="20000"/>
-              </a:spcBef>
-              <a:buClr>
-                <a:schemeClr val="tx2"/>
-              </a:buClr>
-              <a:buFont typeface="Arial" pitchFamily="34" charset="0"/>
-              <a:buChar char="•"/>
-              <a:defRPr sz="2000" kern="1200">
-                <a:solidFill>
-                  <a:schemeClr val="tx1"/>
-                </a:solidFill>
-                <a:latin typeface="+mn-lt"/>
-                <a:ea typeface="+mn-ea"/>
-                <a:cs typeface="+mn-cs"/>
-              </a:defRPr>
-            </a:lvl2pPr>
-            <a:lvl3pPr marL="1143000" indent="-228600" algn="l" defTabSz="914400" rtl="0" eaLnBrk="1" latinLnBrk="0" hangingPunct="1">
-              <a:spcBef>
-                <a:spcPct val="20000"/>
-              </a:spcBef>
-              <a:buClr>
-                <a:schemeClr val="tx2"/>
-              </a:buClr>
-              <a:buFont typeface="Arial" pitchFamily="34" charset="0"/>
-              <a:buChar char="•"/>
-              <a:defRPr sz="1800" kern="1200">
-                <a:solidFill>
-                  <a:schemeClr val="tx1"/>
-                </a:solidFill>
-                <a:latin typeface="+mn-lt"/>
-                <a:ea typeface="+mn-ea"/>
-                <a:cs typeface="+mn-cs"/>
-              </a:defRPr>
-            </a:lvl3pPr>
-            <a:lvl4pPr marL="1600200" indent="-228600" algn="l" defTabSz="914400" rtl="0" eaLnBrk="1" latinLnBrk="0" hangingPunct="1">
-              <a:spcBef>
-                <a:spcPct val="20000"/>
-              </a:spcBef>
-              <a:buClr>
-                <a:schemeClr val="tx2"/>
-              </a:buClr>
-              <a:buFont typeface="Arial" pitchFamily="34" charset="0"/>
-              <a:buChar char="•"/>
-              <a:defRPr sz="1800" kern="1200">
-                <a:solidFill>
-                  <a:schemeClr val="tx1"/>
-                </a:solidFill>
-                <a:latin typeface="+mn-lt"/>
-                <a:ea typeface="+mn-ea"/>
-                <a:cs typeface="+mn-cs"/>
-              </a:defRPr>
-            </a:lvl4pPr>
-            <a:lvl5pPr marL="2057400" indent="-228600" algn="l" defTabSz="914400" rtl="0" eaLnBrk="1" latinLnBrk="0" hangingPunct="1">
-              <a:spcBef>
-                <a:spcPct val="20000"/>
-              </a:spcBef>
-              <a:buClr>
-                <a:schemeClr val="tx2"/>
-              </a:buClr>
-              <a:buFont typeface="Arial" pitchFamily="34" charset="0"/>
-              <a:buChar char="•"/>
-              <a:defRPr sz="1800" kern="1200" baseline="0">
-                <a:solidFill>
-                  <a:schemeClr val="tx1"/>
-                </a:solidFill>
-                <a:latin typeface="+mn-lt"/>
-                <a:ea typeface="+mn-ea"/>
-                <a:cs typeface="+mn-cs"/>
-              </a:defRPr>
-            </a:lvl5pPr>
-            <a:lvl6pPr marL="2514600" indent="-228600" algn="l" defTabSz="914400" rtl="0" eaLnBrk="1" latinLnBrk="0" hangingPunct="1">
-              <a:spcBef>
-                <a:spcPct val="20000"/>
-              </a:spcBef>
-              <a:buClr>
-                <a:schemeClr val="tx2"/>
-              </a:buClr>
-              <a:buFont typeface="Arial" pitchFamily="34" charset="0"/>
-              <a:buChar char="•"/>
-              <a:defRPr sz="1600" kern="1200">
-                <a:solidFill>
-                  <a:schemeClr val="tx1"/>
-                </a:solidFill>
-                <a:latin typeface="+mn-lt"/>
-                <a:ea typeface="+mn-ea"/>
-                <a:cs typeface="+mn-cs"/>
-              </a:defRPr>
-            </a:lvl6pPr>
-            <a:lvl7pPr marL="2971800" indent="-228600" algn="l" defTabSz="914400" rtl="0" eaLnBrk="1" latinLnBrk="0" hangingPunct="1">
-              <a:spcBef>
-                <a:spcPct val="20000"/>
-              </a:spcBef>
-              <a:buClr>
-                <a:schemeClr val="tx2"/>
-              </a:buClr>
-              <a:buFont typeface="Arial" pitchFamily="34" charset="0"/>
-              <a:buChar char="•"/>
-              <a:defRPr sz="1600" kern="1200">
-                <a:solidFill>
-                  <a:schemeClr val="tx1"/>
-                </a:solidFill>
-                <a:latin typeface="+mn-lt"/>
-                <a:ea typeface="+mn-ea"/>
-                <a:cs typeface="+mn-cs"/>
-              </a:defRPr>
-            </a:lvl7pPr>
-            <a:lvl8pPr marL="3429000" indent="-228600" algn="l" defTabSz="914400" rtl="0" eaLnBrk="1" latinLnBrk="0" hangingPunct="1">
-              <a:spcBef>
-                <a:spcPct val="20000"/>
-              </a:spcBef>
-              <a:buClr>
-                <a:schemeClr val="tx2"/>
-              </a:buClr>
-              <a:buFont typeface="Arial" pitchFamily="34" charset="0"/>
-              <a:buChar char="•"/>
-              <a:defRPr sz="1600" kern="1200">
-                <a:solidFill>
-                  <a:schemeClr val="tx1"/>
-                </a:solidFill>
-                <a:latin typeface="+mn-lt"/>
-                <a:ea typeface="+mn-ea"/>
-                <a:cs typeface="+mn-cs"/>
-              </a:defRPr>
-            </a:lvl8pPr>
-            <a:lvl9pPr marL="3886200" indent="-228600" algn="l" defTabSz="914400" rtl="0" eaLnBrk="1" latinLnBrk="0" hangingPunct="1">
-              <a:spcBef>
-                <a:spcPct val="20000"/>
-              </a:spcBef>
-              <a:buClr>
-                <a:schemeClr val="tx2"/>
-              </a:buClr>
-              <a:buFont typeface="Arial" pitchFamily="34" charset="0"/>
-              <a:buChar char="•"/>
-              <a:defRPr sz="1600" kern="1200">
-                <a:solidFill>
-                  <a:schemeClr val="tx1"/>
-                </a:solidFill>
-                <a:latin typeface="+mn-lt"/>
-                <a:ea typeface="+mn-ea"/>
-                <a:cs typeface="+mn-cs"/>
-              </a:defRPr>
-            </a:lvl9pPr>
-          </a:lstStyle>
-          <a:p>
-            <a:r>
-              <a:rPr lang="pt-BR" sz="2800" dirty="0" smtClean="0">
-                <a:latin typeface="Times New Roman" pitchFamily="18" charset="0"/>
-                <a:cs typeface="Times New Roman" pitchFamily="18" charset="0"/>
-              </a:rPr>
-              <a:t>Quarto passo:</a:t>
-            </a:r>
-            <a:endParaRPr lang="pt-BR" sz="2800" dirty="0">
-              <a:latin typeface="Times New Roman" pitchFamily="18" charset="0"/>
-              <a:cs typeface="Times New Roman" pitchFamily="18" charset="0"/>
-            </a:endParaRPr>
-          </a:p>
-          <a:p>
-            <a:pPr algn="just"/>
-            <a:r>
-              <a:rPr lang="pt-BR" sz="2800" b="0" dirty="0">
-                <a:latin typeface="Times New Roman" pitchFamily="18" charset="0"/>
-                <a:cs typeface="Times New Roman" pitchFamily="18" charset="0"/>
-              </a:rPr>
-              <a:t>É válido lembrar que os itens que são importados como módulos, </a:t>
-            </a:r>
-            <a:r>
-              <a:rPr lang="pt-BR" sz="2800" b="0" dirty="0" err="1">
-                <a:latin typeface="Times New Roman" pitchFamily="18" charset="0"/>
-                <a:cs typeface="Times New Roman" pitchFamily="18" charset="0"/>
-              </a:rPr>
-              <a:t>pipes</a:t>
-            </a:r>
-            <a:r>
-              <a:rPr lang="pt-BR" sz="2800" b="0" dirty="0">
-                <a:latin typeface="Times New Roman" pitchFamily="18" charset="0"/>
-                <a:cs typeface="Times New Roman" pitchFamily="18" charset="0"/>
-              </a:rPr>
-              <a:t>, </a:t>
-            </a:r>
-            <a:r>
-              <a:rPr lang="pt-BR" sz="2800" b="0" dirty="0" err="1">
-                <a:latin typeface="Times New Roman" pitchFamily="18" charset="0"/>
-                <a:cs typeface="Times New Roman" pitchFamily="18" charset="0"/>
-              </a:rPr>
-              <a:t>components</a:t>
-            </a:r>
-            <a:r>
-              <a:rPr lang="pt-BR" sz="2800" b="0" dirty="0">
-                <a:latin typeface="Times New Roman" pitchFamily="18" charset="0"/>
-                <a:cs typeface="Times New Roman" pitchFamily="18" charset="0"/>
-              </a:rPr>
-              <a:t>, </a:t>
-            </a:r>
-            <a:r>
-              <a:rPr lang="pt-BR" sz="2800" b="0" dirty="0" err="1">
-                <a:latin typeface="Times New Roman" pitchFamily="18" charset="0"/>
-                <a:cs typeface="Times New Roman" pitchFamily="18" charset="0"/>
-              </a:rPr>
-              <a:t>etc</a:t>
-            </a:r>
-            <a:r>
-              <a:rPr lang="pt-BR" sz="2800" b="0" dirty="0">
-                <a:latin typeface="Times New Roman" pitchFamily="18" charset="0"/>
-                <a:cs typeface="Times New Roman" pitchFamily="18" charset="0"/>
-              </a:rPr>
-              <a:t>, devem ser exportados se forem utilizados de forma compartilhada</a:t>
-            </a:r>
-          </a:p>
-          <a:p>
-            <a:endParaRPr lang="pt-BR" sz="2600" dirty="0"/>
-          </a:p>
-        </p:txBody>
-      </p:sp>
     </p:spTree>
     <p:extLst>
       <p:ext uri="{BB962C8B-B14F-4D97-AF65-F5344CB8AC3E}">
-        <p14:creationId xmlns:p14="http://schemas.microsoft.com/office/powerpoint/2010/main" val="575733719"/>
+        <p14:creationId xmlns:p14="http://schemas.microsoft.com/office/powerpoint/2010/main" val="1044830857"/>
       </p:ext>
     </p:extLst>
   </p:cSld>
   <p:clrMapOvr>
     <a:masterClrMapping/>
   </p:clrMapOvr>
+  <mc:AlternateContent xmlns:mc="http://schemas.openxmlformats.org/markup-compatibility/2006" xmlns:p14="http://schemas.microsoft.com/office/powerpoint/2010/main">
+    <mc:Choice Requires="p14">
+      <p:transition spd="slow" p14:dur="2000"/>
+    </mc:Choice>
+    <mc:Fallback xmlns="">
+      <p:transition spd="slow"/>
+    </mc:Fallback>
+  </mc:AlternateContent>
   <p:timing>
     <p:tnLst>
       <p:par>
@@ -8870,20 +9037,14 @@
           <a:p>
             <a:pPr algn="just"/>
             <a:r>
-              <a:rPr lang="pt-BR" sz="2400" b="1" dirty="0"/>
-              <a:t>CRIANDO UM MENU, TELA DE LOGIN </a:t>
-            </a:r>
-            <a:br>
-              <a:rPr lang="pt-BR" sz="2400" b="1" dirty="0"/>
-            </a:br>
+              <a:rPr lang="pt-BR" sz="2400" b="1" dirty="0" err="1" smtClean="0"/>
+              <a:t>Login</a:t>
+            </a:r>
             <a:r>
               <a:rPr lang="pt-BR" sz="2400" b="1" dirty="0" smtClean="0"/>
-              <a:t>E </a:t>
-            </a:r>
-            <a:r>
-              <a:rPr lang="pt-BR" sz="2400" b="1" dirty="0"/>
-              <a:t>CONTROLE DE EXIBIÇÃO DE MENU</a:t>
-            </a:r>
+              <a:t> e menu dinâmico	</a:t>
+            </a:r>
+            <a:endParaRPr lang="pt-BR" sz="2400" b="1" dirty="0"/>
           </a:p>
         </p:txBody>
       </p:sp>
@@ -9271,20 +9432,14 @@
           <a:p>
             <a:pPr algn="just"/>
             <a:r>
+              <a:rPr lang="pt-BR" sz="2400" b="1" dirty="0" err="1"/>
+              <a:t>Login</a:t>
+            </a:r>
+            <a:r>
               <a:rPr lang="pt-BR" sz="2400" b="1" dirty="0"/>
-              <a:t>CRIANDO UM MENU, TELA DE LOGIN </a:t>
-            </a:r>
-            <a:br>
-              <a:rPr lang="pt-BR" sz="2400" b="1" dirty="0"/>
-            </a:br>
-            <a:r>
-              <a:rPr lang="pt-BR" sz="2400" b="1" dirty="0" smtClean="0"/>
-              <a:t>E </a:t>
-            </a:r>
-            <a:r>
-              <a:rPr lang="pt-BR" sz="2400" b="1" dirty="0"/>
-              <a:t>CONTROLE DE EXIBIÇÃO DE MENU</a:t>
-            </a:r>
+              <a:t> e menu dinâmico</a:t>
+            </a:r>
+            <a:endParaRPr lang="pt-BR" sz="2400" b="1" dirty="0"/>
           </a:p>
         </p:txBody>
       </p:sp>
@@ -9456,8 +9611,8 @@
         </p:blipFill>
         <p:spPr bwMode="auto">
           <a:xfrm>
-            <a:off x="1196342" y="3645024"/>
-            <a:ext cx="6593160" cy="199752"/>
+            <a:off x="539551" y="3284984"/>
+            <a:ext cx="8138837" cy="246581"/>
           </a:xfrm>
           <a:prstGeom prst="rect">
             <a:avLst/>
@@ -9558,20 +9713,14 @@
           <a:p>
             <a:pPr algn="just"/>
             <a:r>
+              <a:rPr lang="pt-BR" sz="2400" b="1" dirty="0" err="1"/>
+              <a:t>Login</a:t>
+            </a:r>
+            <a:r>
               <a:rPr lang="pt-BR" sz="2400" b="1" dirty="0"/>
-              <a:t>CRIANDO UM MENU, TELA DE LOGIN </a:t>
-            </a:r>
-            <a:br>
-              <a:rPr lang="pt-BR" sz="2400" b="1" dirty="0"/>
-            </a:br>
-            <a:r>
-              <a:rPr lang="pt-BR" sz="2400" b="1" dirty="0" smtClean="0"/>
-              <a:t>E </a:t>
-            </a:r>
-            <a:r>
-              <a:rPr lang="pt-BR" sz="2400" b="1" dirty="0"/>
-              <a:t>CONTROLE DE EXIBIÇÃO DE MENU</a:t>
-            </a:r>
+              <a:t> e menu dinâmico</a:t>
+            </a:r>
+            <a:endParaRPr lang="pt-BR" sz="2400" b="1" dirty="0"/>
           </a:p>
         </p:txBody>
       </p:sp>
@@ -9797,7 +9946,6 @@
           </a:bodyPr>
           <a:lstStyle/>
           <a:p>
-            <a:pPr algn="ctr"/>
             <a:r>
               <a:rPr lang="pt-BR" sz="2400" b="1" dirty="0"/>
               <a:t>Configurando </a:t>
@@ -10121,7 +10269,6 @@
           </a:bodyPr>
           <a:lstStyle/>
           <a:p>
-            <a:pPr algn="ctr"/>
             <a:r>
               <a:rPr lang="pt-BR" sz="2400" b="1" dirty="0"/>
               <a:t>Configurando </a:t>
@@ -10852,7 +10999,21 @@
                 <a:latin typeface="Times New Roman" pitchFamily="18" charset="0"/>
                 <a:cs typeface="Times New Roman" pitchFamily="18" charset="0"/>
               </a:rPr>
-              <a:t> percebemos que o menu independente da rota sempre irá aparecer. Não é muito amigável exibir um menu na tela de </a:t>
+              <a:t> percebemos que o menu independente da rota sempre irá </a:t>
+            </a:r>
+            <a:r>
+              <a:rPr lang="pt-BR" sz="2800" b="0" dirty="0" smtClean="0">
+                <a:latin typeface="Times New Roman" pitchFamily="18" charset="0"/>
+                <a:cs typeface="Times New Roman" pitchFamily="18" charset="0"/>
+              </a:rPr>
+              <a:t>aparecer que não </a:t>
+            </a:r>
+            <a:r>
+              <a:rPr lang="pt-BR" sz="2800" b="0" dirty="0">
+                <a:latin typeface="Times New Roman" pitchFamily="18" charset="0"/>
+                <a:cs typeface="Times New Roman" pitchFamily="18" charset="0"/>
+              </a:rPr>
+              <a:t>é muito amigável exibir um menu na tela de </a:t>
             </a:r>
             <a:r>
               <a:rPr lang="pt-BR" sz="2800" b="0" dirty="0" err="1">
@@ -10862,35 +11023,59 @@
               <a:t>login</a:t>
             </a:r>
             <a:r>
+              <a:rPr lang="pt-BR" sz="2800" b="0" dirty="0" smtClean="0">
+                <a:latin typeface="Times New Roman" pitchFamily="18" charset="0"/>
+                <a:cs typeface="Times New Roman" pitchFamily="18" charset="0"/>
+              </a:rPr>
+              <a:t>.</a:t>
+            </a:r>
+          </a:p>
+          <a:p>
+            <a:pPr algn="just"/>
+            <a:r>
+              <a:rPr lang="pt-BR" sz="2800" dirty="0" smtClean="0">
+                <a:latin typeface="Times New Roman" pitchFamily="18" charset="0"/>
+                <a:cs typeface="Times New Roman" pitchFamily="18" charset="0"/>
+              </a:rPr>
+              <a:t>Implementação:</a:t>
+            </a:r>
+            <a:endParaRPr lang="pt-BR" sz="2800" dirty="0">
+              <a:latin typeface="Times New Roman" pitchFamily="18" charset="0"/>
+              <a:cs typeface="Times New Roman" pitchFamily="18" charset="0"/>
+            </a:endParaRPr>
+          </a:p>
+          <a:p>
+            <a:pPr marL="457200" indent="-457200" algn="just">
+              <a:buFont typeface="Wingdings" panose="05000000000000000000" pitchFamily="2" charset="2"/>
+              <a:buChar char="Ø"/>
+            </a:pPr>
+            <a:r>
+              <a:rPr lang="pt-BR" sz="2800" b="0" dirty="0" smtClean="0">
+                <a:latin typeface="Times New Roman" pitchFamily="18" charset="0"/>
+                <a:cs typeface="Times New Roman" pitchFamily="18" charset="0"/>
+              </a:rPr>
+              <a:t>Criar </a:t>
+            </a:r>
+            <a:r>
               <a:rPr lang="pt-BR" sz="2800" b="0" dirty="0">
                 <a:latin typeface="Times New Roman" pitchFamily="18" charset="0"/>
                 <a:cs typeface="Times New Roman" pitchFamily="18" charset="0"/>
               </a:rPr>
+              <a:t>o serviço de autenticação </a:t>
+            </a:r>
+            <a:r>
+              <a:rPr lang="pt-BR" sz="2800" b="0" dirty="0" err="1" smtClean="0">
+                <a:latin typeface="Times New Roman" pitchFamily="18" charset="0"/>
+                <a:cs typeface="Times New Roman" pitchFamily="18" charset="0"/>
+              </a:rPr>
+              <a:t>auth.service</a:t>
+            </a:r>
+            <a:r>
+              <a:rPr lang="pt-BR" sz="2800" b="0" dirty="0" smtClean="0">
+                <a:latin typeface="Times New Roman" pitchFamily="18" charset="0"/>
+                <a:cs typeface="Times New Roman" pitchFamily="18" charset="0"/>
+              </a:rPr>
               <a:t>.</a:t>
-            </a:r>
-          </a:p>
-          <a:p>
-            <a:pPr algn="just"/>
-            <a:r>
-              <a:rPr lang="pt-BR" sz="2800" b="0" dirty="0" smtClean="0">
-                <a:latin typeface="Times New Roman" pitchFamily="18" charset="0"/>
-                <a:cs typeface="Times New Roman" pitchFamily="18" charset="0"/>
-              </a:rPr>
-              <a:t>- Criar </a:t>
-            </a:r>
-            <a:r>
-              <a:rPr lang="pt-BR" sz="2800" b="0" dirty="0">
-                <a:latin typeface="Times New Roman" pitchFamily="18" charset="0"/>
-                <a:cs typeface="Times New Roman" pitchFamily="18" charset="0"/>
-              </a:rPr>
-              <a:t>o serviço de autenticação </a:t>
-            </a:r>
-            <a:r>
-              <a:rPr lang="pt-BR" sz="2800" b="0" dirty="0" err="1">
-                <a:latin typeface="Times New Roman" pitchFamily="18" charset="0"/>
-                <a:cs typeface="Times New Roman" pitchFamily="18" charset="0"/>
-              </a:rPr>
-              <a:t>auth.service</a:t>
             </a:r>
             <a:endParaRPr lang="pt-BR" sz="2800" b="0" dirty="0">
               <a:latin typeface="Times New Roman" pitchFamily="18" charset="0"/>
@@ -10898,13 +11083,16 @@
             </a:endParaRPr>
           </a:p>
           <a:p>
-            <a:pPr algn="just"/>
+            <a:pPr marL="914400" lvl="1" indent="-457200" algn="just">
+              <a:buFont typeface="Wingdings" panose="05000000000000000000" pitchFamily="2" charset="2"/>
+              <a:buChar char="Ø"/>
+            </a:pPr>
             <a:r>
               <a:rPr lang="pt-BR" sz="2800" b="0" dirty="0" smtClean="0">
                 <a:latin typeface="Times New Roman" pitchFamily="18" charset="0"/>
                 <a:cs typeface="Times New Roman" pitchFamily="18" charset="0"/>
               </a:rPr>
-              <a:t>- Método </a:t>
+              <a:t>Método </a:t>
             </a:r>
             <a:r>
               <a:rPr lang="pt-BR" sz="2800" b="0" dirty="0">
@@ -12627,6 +12815,58 @@
           <a:chExt cx="0" cy="0"/>
         </a:xfrm>
       </p:grpSpPr>
+      <p:pic>
+        <p:nvPicPr>
+          <p:cNvPr id="9" name="Picture 3"/>
+          <p:cNvPicPr>
+            <a:picLocks noChangeAspect="1" noChangeArrowheads="1"/>
+          </p:cNvPicPr>
+          <p:nvPr/>
+        </p:nvPicPr>
+        <p:blipFill rotWithShape="1">
+          <a:blip r:embed="rId2">
+            <a:extLst>
+              <a:ext uri="{28A0092B-C50C-407E-A947-70E740481C1C}">
+                <a14:useLocalDpi xmlns:a14="http://schemas.microsoft.com/office/drawing/2010/main" val="0"/>
+              </a:ext>
+            </a:extLst>
+          </a:blip>
+          <a:srcRect l="58578" t="52517" r="10210" b="38365"/>
+          <a:stretch/>
+        </p:blipFill>
+        <p:spPr bwMode="auto">
+          <a:xfrm>
+            <a:off x="2699792" y="5616796"/>
+            <a:ext cx="6120764" cy="952999"/>
+          </a:xfrm>
+          <a:prstGeom prst="rect">
+            <a:avLst/>
+          </a:prstGeom>
+          <a:noFill/>
+          <a:ln>
+            <a:noFill/>
+          </a:ln>
+          <a:extLst>
+            <a:ext uri="{909E8E84-426E-40DD-AFC4-6F175D3DCCD1}">
+              <a14:hiddenFill xmlns:a14="http://schemas.microsoft.com/office/drawing/2010/main">
+                <a:solidFill>
+                  <a:schemeClr val="accent1"/>
+                </a:solidFill>
+              </a14:hiddenFill>
+            </a:ext>
+            <a:ext uri="{91240B29-F687-4F45-9708-019B960494DF}">
+              <a14:hiddenLine xmlns:a14="http://schemas.microsoft.com/office/drawing/2010/main" w="9525">
+                <a:solidFill>
+                  <a:schemeClr val="tx1"/>
+                </a:solidFill>
+                <a:miter lim="800000"/>
+                <a:headEnd/>
+                <a:tailEnd/>
+              </a14:hiddenLine>
+            </a:ext>
+          </a:extLst>
+        </p:spPr>
+      </p:pic>
       <p:sp>
         <p:nvSpPr>
           <p:cNvPr id="2" name="Título 1"/>
@@ -12649,7 +12889,6 @@
           </a:bodyPr>
           <a:lstStyle/>
           <a:p>
-            <a:pPr algn="ctr"/>
             <a:r>
               <a:rPr lang="pt-BR" sz="2800" b="1" dirty="0" smtClean="0"/>
               <a:t>UM </a:t>
@@ -12716,7 +12955,7 @@
           <p:nvPr/>
         </p:nvPicPr>
         <p:blipFill rotWithShape="1">
-          <a:blip r:embed="rId2" cstate="print">
+          <a:blip r:embed="rId3" cstate="print">
             <a:extLst>
               <a:ext uri="{28A0092B-C50C-407E-A947-70E740481C1C}">
                 <a14:useLocalDpi xmlns:a14="http://schemas.microsoft.com/office/drawing/2010/main" val="0"/>
@@ -13016,10 +13255,140 @@
   <p:clrMapOvr>
     <a:masterClrMapping/>
   </p:clrMapOvr>
+  <mc:AlternateContent xmlns:mc="http://schemas.openxmlformats.org/markup-compatibility/2006">
+    <mc:Choice xmlns:p14="http://schemas.microsoft.com/office/powerpoint/2010/main" Requires="p14">
+      <p:transition p14:dur="10"/>
+    </mc:Choice>
+    <mc:Fallback>
+      <p:transition/>
+    </mc:Fallback>
+  </mc:AlternateContent>
   <p:timing>
     <p:tnLst>
       <p:par>
-        <p:cTn id="1" dur="indefinite" restart="never" nodeType="tmRoot"/>
+        <p:cTn id="1" dur="indefinite" restart="never" nodeType="tmRoot">
+          <p:childTnLst>
+            <p:seq concurrent="1" nextAc="seek">
+              <p:cTn id="2" dur="indefinite" nodeType="mainSeq">
+                <p:childTnLst>
+                  <p:par>
+                    <p:cTn id="3" fill="hold">
+                      <p:stCondLst>
+                        <p:cond delay="indefinite"/>
+                      </p:stCondLst>
+                      <p:childTnLst>
+                        <p:par>
+                          <p:cTn id="4" fill="hold">
+                            <p:stCondLst>
+                              <p:cond delay="0"/>
+                            </p:stCondLst>
+                            <p:childTnLst>
+                              <p:par>
+                                <p:cTn id="5" presetID="42" presetClass="entr" presetSubtype="0" fill="hold" nodeType="clickEffect">
+                                  <p:stCondLst>
+                                    <p:cond delay="0"/>
+                                  </p:stCondLst>
+                                  <p:childTnLst>
+                                    <p:set>
+                                      <p:cBhvr>
+                                        <p:cTn id="6" dur="1" fill="hold">
+                                          <p:stCondLst>
+                                            <p:cond delay="0"/>
+                                          </p:stCondLst>
+                                        </p:cTn>
+                                        <p:tgtEl>
+                                          <p:spTgt spid="9"/>
+                                        </p:tgtEl>
+                                        <p:attrNameLst>
+                                          <p:attrName>style.visibility</p:attrName>
+                                        </p:attrNameLst>
+                                      </p:cBhvr>
+                                      <p:to>
+                                        <p:strVal val="visible"/>
+                                      </p:to>
+                                    </p:set>
+                                    <p:animEffect transition="in" filter="fade">
+                                      <p:cBhvr>
+                                        <p:cTn id="7" dur="1000"/>
+                                        <p:tgtEl>
+                                          <p:spTgt spid="9"/>
+                                        </p:tgtEl>
+                                      </p:cBhvr>
+                                    </p:animEffect>
+                                    <p:anim calcmode="lin" valueType="num">
+                                      <p:cBhvr>
+                                        <p:cTn id="8" dur="1000" fill="hold"/>
+                                        <p:tgtEl>
+                                          <p:spTgt spid="9"/>
+                                        </p:tgtEl>
+                                        <p:attrNameLst>
+                                          <p:attrName>ppt_x</p:attrName>
+                                        </p:attrNameLst>
+                                      </p:cBhvr>
+                                      <p:tavLst>
+                                        <p:tav tm="0">
+                                          <p:val>
+                                            <p:strVal val="#ppt_x"/>
+                                          </p:val>
+                                        </p:tav>
+                                        <p:tav tm="100000">
+                                          <p:val>
+                                            <p:strVal val="#ppt_x"/>
+                                          </p:val>
+                                        </p:tav>
+                                      </p:tavLst>
+                                    </p:anim>
+                                    <p:anim calcmode="lin" valueType="num">
+                                      <p:cBhvr>
+                                        <p:cTn id="9" dur="1000" fill="hold"/>
+                                        <p:tgtEl>
+                                          <p:spTgt spid="9"/>
+                                        </p:tgtEl>
+                                        <p:attrNameLst>
+                                          <p:attrName>ppt_y</p:attrName>
+                                        </p:attrNameLst>
+                                      </p:cBhvr>
+                                      <p:tavLst>
+                                        <p:tav tm="0">
+                                          <p:val>
+                                            <p:strVal val="#ppt_y+.1"/>
+                                          </p:val>
+                                        </p:tav>
+                                        <p:tav tm="100000">
+                                          <p:val>
+                                            <p:strVal val="#ppt_y"/>
+                                          </p:val>
+                                        </p:tav>
+                                      </p:tavLst>
+                                    </p:anim>
+                                  </p:childTnLst>
+                                </p:cTn>
+                              </p:par>
+                            </p:childTnLst>
+                          </p:cTn>
+                        </p:par>
+                      </p:childTnLst>
+                    </p:cTn>
+                  </p:par>
+                </p:childTnLst>
+              </p:cTn>
+              <p:prevCondLst>
+                <p:cond evt="onPrev" delay="0">
+                  <p:tgtEl>
+                    <p:sldTgt/>
+                  </p:tgtEl>
+                </p:cond>
+              </p:prevCondLst>
+              <p:nextCondLst>
+                <p:cond evt="onNext" delay="0">
+                  <p:tgtEl>
+                    <p:sldTgt/>
+                  </p:tgtEl>
+                </p:cond>
+              </p:nextCondLst>
+            </p:seq>
+          </p:childTnLst>
+        </p:cTn>
       </p:par>
     </p:tnLst>
   </p:timing>
@@ -13065,7 +13434,6 @@
           </a:bodyPr>
           <a:lstStyle/>
           <a:p>
-            <a:pPr algn="ctr"/>
             <a:r>
               <a:rPr lang="pt-BR" sz="2800" b="1" dirty="0" smtClean="0"/>
               <a:t>UM </a:t>
@@ -13539,7 +13907,6 @@
           </a:bodyPr>
           <a:lstStyle/>
           <a:p>
-            <a:pPr algn="ctr"/>
             <a:r>
               <a:rPr lang="pt-BR" sz="2800" b="1" dirty="0" smtClean="0"/>
               <a:t>UM </a:t>
@@ -14209,7 +14576,7 @@
         </p:nvGraphicFramePr>
         <p:xfrm>
           <a:off x="539552" y="2996952"/>
-          <a:ext cx="8208911" cy="3156688"/>
+          <a:ext cx="8208911" cy="3120176"/>
         </p:xfrm>
         <a:graphic>
           <a:graphicData uri="http://schemas.openxmlformats.org/drawingml/2006/table">
@@ -14941,7 +15308,6 @@
           </a:bodyPr>
           <a:lstStyle/>
           <a:p>
-            <a:pPr algn="ctr"/>
             <a:r>
               <a:rPr lang="pt-BR" sz="2800" b="1" dirty="0" smtClean="0"/>
               <a:t>UM </a:t>
@@ -15412,7 +15778,6 @@
           </a:bodyPr>
           <a:lstStyle/>
           <a:p>
-            <a:pPr algn="ctr"/>
             <a:r>
               <a:rPr lang="pt-BR" sz="2800" b="1" dirty="0" smtClean="0"/>
               <a:t>UM </a:t>
@@ -15902,7 +16267,7 @@
           <a:p>
             <a:r>
               <a:rPr lang="pt-BR" sz="2700" dirty="0" smtClean="0"/>
-              <a:t>Exercício</a:t>
+              <a:t>Exercícios</a:t>
             </a:r>
             <a:endParaRPr lang="pt-BR" sz="2700" dirty="0"/>
           </a:p>
@@ -16000,18 +16365,6 @@
           </a:bodyPr>
           <a:lstStyle/>
           <a:p>
-            <a:pPr lvl="0">
-              <a:lnSpc>
-                <a:spcPct val="120000"/>
-              </a:lnSpc>
-            </a:pPr>
-            <a:r>
-              <a:rPr lang="pt-BR" b="0" dirty="0"/>
-              <a:t>	</a:t>
-            </a:r>
-            <a:endParaRPr lang="pt-BR" b="0" dirty="0" smtClean="0"/>
-          </a:p>
-          <a:p>
             <a:pPr marL="342900" indent="-342900">
               <a:lnSpc>
                 <a:spcPct val="120000"/>
@@ -16020,30 +16373,67 @@
               <a:buChar char="•"/>
             </a:pPr>
             <a:r>
-              <a:rPr lang="pt-BR" b="0" dirty="0" smtClean="0"/>
-              <a:t>Criando </a:t>
-            </a:r>
-            <a:r>
-              <a:rPr lang="pt-BR" b="0" dirty="0"/>
-              <a:t>componentes compartilhados com </a:t>
-            </a:r>
-            <a:r>
-              <a:rPr lang="pt-BR" b="0" dirty="0" err="1"/>
-              <a:t>PrimeNG</a:t>
-            </a:r>
-            <a:r>
-              <a:rPr lang="pt-BR" b="0" dirty="0"/>
-              <a:t>.</a:t>
-            </a:r>
-          </a:p>
-          <a:p>
-            <a:pPr marL="342900" lvl="0" indent="-342900">
+              <a:rPr lang="pt-BR" sz="2400" b="0" dirty="0" smtClean="0">
+                <a:latin typeface="Times New Roman" panose="02020603050405020304" pitchFamily="18" charset="0"/>
+                <a:cs typeface="Times New Roman" panose="02020603050405020304" pitchFamily="18" charset="0"/>
+              </a:rPr>
+              <a:t>Exercício </a:t>
+            </a:r>
+            <a:r>
+              <a:rPr lang="pt-BR" sz="2400" b="0" dirty="0">
+                <a:latin typeface="Times New Roman" panose="02020603050405020304" pitchFamily="18" charset="0"/>
+                <a:cs typeface="Times New Roman" panose="02020603050405020304" pitchFamily="18" charset="0"/>
+              </a:rPr>
+              <a:t>3 da lista de </a:t>
+            </a:r>
+            <a:r>
+              <a:rPr lang="pt-BR" sz="2400" b="0" dirty="0" smtClean="0">
+                <a:latin typeface="Times New Roman" panose="02020603050405020304" pitchFamily="18" charset="0"/>
+                <a:cs typeface="Times New Roman" panose="02020603050405020304" pitchFamily="18" charset="0"/>
+              </a:rPr>
+              <a:t>exercícios</a:t>
+            </a:r>
+            <a:endParaRPr lang="pt-BR" sz="2400" b="0" dirty="0" smtClean="0">
+              <a:latin typeface="Times New Roman" panose="02020603050405020304" pitchFamily="18" charset="0"/>
+              <a:cs typeface="Times New Roman" panose="02020603050405020304" pitchFamily="18" charset="0"/>
+            </a:endParaRPr>
+          </a:p>
+          <a:p>
+            <a:pPr marL="342900" indent="-342900">
               <a:lnSpc>
                 <a:spcPct val="120000"/>
               </a:lnSpc>
               <a:buFont typeface="Arial" pitchFamily="34" charset="0"/>
               <a:buChar char="•"/>
             </a:pPr>
+            <a:r>
+              <a:rPr lang="pt-BR" sz="2400" b="0" dirty="0" smtClean="0">
+                <a:latin typeface="Times New Roman" panose="02020603050405020304" pitchFamily="18" charset="0"/>
+                <a:cs typeface="Times New Roman" panose="02020603050405020304" pitchFamily="18" charset="0"/>
+              </a:rPr>
+              <a:t>Criando </a:t>
+            </a:r>
+            <a:r>
+              <a:rPr lang="pt-BR" sz="2400" b="0" dirty="0">
+                <a:latin typeface="Times New Roman" panose="02020603050405020304" pitchFamily="18" charset="0"/>
+                <a:cs typeface="Times New Roman" panose="02020603050405020304" pitchFamily="18" charset="0"/>
+              </a:rPr>
+              <a:t>componentes compartilhados com </a:t>
+            </a:r>
+            <a:r>
+              <a:rPr lang="pt-BR" sz="2400" b="0" dirty="0" err="1">
+                <a:latin typeface="Times New Roman" panose="02020603050405020304" pitchFamily="18" charset="0"/>
+                <a:cs typeface="Times New Roman" panose="02020603050405020304" pitchFamily="18" charset="0"/>
+              </a:rPr>
+              <a:t>PrimeNG</a:t>
+            </a:r>
+            <a:r>
+              <a:rPr lang="pt-BR" sz="2400" b="0" dirty="0" smtClean="0">
+                <a:latin typeface="Times New Roman" panose="02020603050405020304" pitchFamily="18" charset="0"/>
+                <a:cs typeface="Times New Roman" panose="02020603050405020304" pitchFamily="18" charset="0"/>
+              </a:rPr>
+              <a:t>.</a:t>
+            </a:r>
             <a:endParaRPr lang="pt-BR" sz="2600" b="0" dirty="0">
               <a:solidFill>
                 <a:srgbClr val="000000"/>

</xml_diff>